<commit_message>
Updates for .NET 7
</commit_message>
<xml_diff>
--- a/5. Containers/dotnet-workshop-containers.pptx
+++ b/5. Containers/dotnet-workshop-containers.pptx
@@ -10,10 +10,10 @@
     <p:sldMasterId id="2147484637" r:id="rId9"/>
   </p:sldMasterIdLst>
   <p:notesMasterIdLst>
-    <p:notesMasterId r:id="rId26"/>
+    <p:notesMasterId r:id="rId27"/>
   </p:notesMasterIdLst>
   <p:handoutMasterIdLst>
-    <p:handoutMasterId r:id="rId27"/>
+    <p:handoutMasterId r:id="rId28"/>
   </p:handoutMasterIdLst>
   <p:sldIdLst>
     <p:sldId id="257" r:id="rId10"/>
@@ -29,9 +29,10 @@
     <p:sldId id="2147469851" r:id="rId20"/>
     <p:sldId id="2147469853" r:id="rId21"/>
     <p:sldId id="2147469857" r:id="rId22"/>
-    <p:sldId id="2147469854" r:id="rId23"/>
-    <p:sldId id="2147469855" r:id="rId24"/>
-    <p:sldId id="2147469856" r:id="rId25"/>
+    <p:sldId id="2147469859" r:id="rId23"/>
+    <p:sldId id="2147469858" r:id="rId24"/>
+    <p:sldId id="2147469854" r:id="rId25"/>
+    <p:sldId id="2147469855" r:id="rId26"/>
   </p:sldIdLst>
   <p:sldSz cx="12436475" cy="6994525"/>
   <p:notesSz cx="6858000" cy="9144000"/>
@@ -148,9 +149,10 @@
             <p14:sldId id="2147469851"/>
             <p14:sldId id="2147469853"/>
             <p14:sldId id="2147469857"/>
+            <p14:sldId id="2147469859"/>
+            <p14:sldId id="2147469858"/>
             <p14:sldId id="2147469854"/>
             <p14:sldId id="2147469855"/>
-            <p14:sldId id="2147469856"/>
           </p14:sldIdLst>
         </p14:section>
       </p14:sectionLst>
@@ -1126,6 +1128,309 @@
 </c:chartSpace>
 </file>
 
+<file path=ppt/charts/chart3.xml><?xml version="1.0" encoding="utf-8"?>
+<c:chartSpace xmlns:c="http://schemas.openxmlformats.org/drawingml/2006/chart" xmlns:a="http://schemas.openxmlformats.org/drawingml/2006/main" xmlns:r="http://schemas.openxmlformats.org/officeDocument/2006/relationships" xmlns:c16r2="http://schemas.microsoft.com/office/drawing/2015/06/chart">
+  <c:date1904 val="0"/>
+  <c:lang val="en-US"/>
+  <c:roundedCorners val="0"/>
+  <mc:AlternateContent xmlns:mc="http://schemas.openxmlformats.org/markup-compatibility/2006">
+    <mc:Choice xmlns:c14="http://schemas.microsoft.com/office/drawing/2007/8/2/chart" Requires="c14">
+      <c14:style val="102"/>
+    </mc:Choice>
+    <mc:Fallback>
+      <c:style val="2"/>
+    </mc:Fallback>
+  </mc:AlternateContent>
+  <c:chart>
+    <c:title>
+      <c:tx>
+        <c:rich>
+          <a:bodyPr rot="0" spcFirstLastPara="1" vertOverflow="ellipsis" vert="horz" wrap="square" anchor="ctr" anchorCtr="1"/>
+          <a:lstStyle/>
+          <a:p>
+            <a:pPr>
+              <a:defRPr sz="2128" b="1" i="0" u="none" strike="noStrike" kern="1200" baseline="0">
+                <a:solidFill>
+                  <a:schemeClr val="tx1">
+                    <a:lumMod val="65000"/>
+                    <a:lumOff val="35000"/>
+                  </a:schemeClr>
+                </a:solidFill>
+                <a:latin typeface="+mn-lt"/>
+                <a:ea typeface="+mn-ea"/>
+                <a:cs typeface="+mn-cs"/>
+              </a:defRPr>
+            </a:pPr>
+            <a:r>
+              <a:rPr lang="en-US" dirty="0"/>
+              <a:t>ASP.NET</a:t>
+            </a:r>
+            <a:r>
+              <a:rPr lang="en-US" baseline="0" dirty="0"/>
+              <a:t> Core on Ubuntu</a:t>
+            </a:r>
+            <a:endParaRPr lang="en-US" dirty="0"/>
+          </a:p>
+        </c:rich>
+      </c:tx>
+      <c:layout>
+        <c:manualLayout>
+          <c:xMode val="edge"/>
+          <c:yMode val="edge"/>
+          <c:x val="0.17938082202424163"/>
+          <c:y val="1.973618266484569E-2"/>
+        </c:manualLayout>
+      </c:layout>
+      <c:overlay val="0"/>
+      <c:spPr>
+        <a:noFill/>
+        <a:ln>
+          <a:noFill/>
+        </a:ln>
+        <a:effectLst/>
+      </c:spPr>
+      <c:txPr>
+        <a:bodyPr rot="0" spcFirstLastPara="1" vertOverflow="ellipsis" vert="horz" wrap="square" anchor="ctr" anchorCtr="1"/>
+        <a:lstStyle/>
+        <a:p>
+          <a:pPr>
+            <a:defRPr sz="2128" b="1" i="0" u="none" strike="noStrike" kern="1200" baseline="0">
+              <a:solidFill>
+                <a:schemeClr val="tx1">
+                  <a:lumMod val="65000"/>
+                  <a:lumOff val="35000"/>
+                </a:schemeClr>
+              </a:solidFill>
+              <a:latin typeface="+mn-lt"/>
+              <a:ea typeface="+mn-ea"/>
+              <a:cs typeface="+mn-cs"/>
+            </a:defRPr>
+          </a:pPr>
+          <a:endParaRPr lang="en-US"/>
+        </a:p>
+      </c:txPr>
+    </c:title>
+    <c:autoTitleDeleted val="0"/>
+    <c:plotArea>
+      <c:layout>
+        <c:manualLayout>
+          <c:layoutTarget val="inner"/>
+          <c:xMode val="edge"/>
+          <c:yMode val="edge"/>
+          <c:x val="0.29371444595720198"/>
+          <c:y val="0.15881074218148011"/>
+          <c:w val="0.59641702248934236"/>
+          <c:h val="0.7090531838321813"/>
+        </c:manualLayout>
+      </c:layout>
+      <c:barChart>
+        <c:barDir val="col"/>
+        <c:grouping val="clustered"/>
+        <c:varyColors val="0"/>
+        <c:ser>
+          <c:idx val="0"/>
+          <c:order val="0"/>
+          <c:tx>
+            <c:strRef>
+              <c:f>Sheet1!$B$1</c:f>
+              <c:strCache>
+                <c:ptCount val="1"/>
+                <c:pt idx="0">
+                  <c:v>Series 1</c:v>
+                </c:pt>
+              </c:strCache>
+            </c:strRef>
+          </c:tx>
+          <c:spPr>
+            <a:gradFill rotWithShape="1">
+              <a:gsLst>
+                <a:gs pos="0">
+                  <a:schemeClr val="accent1">
+                    <a:satMod val="103000"/>
+                    <a:lumMod val="102000"/>
+                    <a:tint val="94000"/>
+                  </a:schemeClr>
+                </a:gs>
+                <a:gs pos="50000">
+                  <a:schemeClr val="accent1">
+                    <a:satMod val="110000"/>
+                    <a:lumMod val="100000"/>
+                    <a:shade val="100000"/>
+                  </a:schemeClr>
+                </a:gs>
+                <a:gs pos="100000">
+                  <a:schemeClr val="accent1">
+                    <a:lumMod val="99000"/>
+                    <a:satMod val="120000"/>
+                    <a:shade val="78000"/>
+                  </a:schemeClr>
+                </a:gs>
+              </a:gsLst>
+              <a:lin ang="5400000" scaled="0"/>
+            </a:gradFill>
+            <a:ln>
+              <a:noFill/>
+            </a:ln>
+            <a:effectLst>
+              <a:outerShdw blurRad="57150" dist="19050" dir="5400000" algn="ctr" rotWithShape="0">
+                <a:srgbClr val="000000">
+                  <a:alpha val="63000"/>
+                </a:srgbClr>
+              </a:outerShdw>
+            </a:effectLst>
+          </c:spPr>
+          <c:invertIfNegative val="0"/>
+          <c:cat>
+            <c:strRef>
+              <c:f>Sheet1!$A$2:$A$5</c:f>
+              <c:strCache>
+                <c:ptCount val="2"/>
+                <c:pt idx="0">
+                  <c:v>Ubuntu</c:v>
+                </c:pt>
+                <c:pt idx="1">
+                  <c:v>Chiseled</c:v>
+                </c:pt>
+              </c:strCache>
+            </c:strRef>
+          </c:cat>
+          <c:val>
+            <c:numRef>
+              <c:f>Sheet1!$B$2:$B$5</c:f>
+              <c:numCache>
+                <c:formatCode>General</c:formatCode>
+                <c:ptCount val="4"/>
+                <c:pt idx="0">
+                  <c:v>213</c:v>
+                </c:pt>
+                <c:pt idx="1">
+                  <c:v>104</c:v>
+                </c:pt>
+              </c:numCache>
+            </c:numRef>
+          </c:val>
+          <c:extLst>
+            <c:ext xmlns:c16="http://schemas.microsoft.com/office/drawing/2014/chart" uri="{C3380CC4-5D6E-409C-BE32-E72D297353CC}">
+              <c16:uniqueId val="{00000000-1581-418B-B4BC-5B3042BD9AD9}"/>
+            </c:ext>
+          </c:extLst>
+        </c:ser>
+        <c:dLbls>
+          <c:showLegendKey val="0"/>
+          <c:showVal val="0"/>
+          <c:showCatName val="0"/>
+          <c:showSerName val="0"/>
+          <c:showPercent val="0"/>
+          <c:showBubbleSize val="0"/>
+        </c:dLbls>
+        <c:gapWidth val="100"/>
+        <c:overlap val="-92"/>
+        <c:axId val="802075359"/>
+        <c:axId val="802104479"/>
+      </c:barChart>
+      <c:catAx>
+        <c:axId val="802075359"/>
+        <c:scaling>
+          <c:orientation val="minMax"/>
+        </c:scaling>
+        <c:delete val="0"/>
+        <c:axPos val="b"/>
+        <c:numFmt formatCode="General" sourceLinked="1"/>
+        <c:majorTickMark val="none"/>
+        <c:minorTickMark val="none"/>
+        <c:tickLblPos val="nextTo"/>
+        <c:spPr>
+          <a:noFill/>
+          <a:ln w="0" cap="flat" cmpd="sng" algn="ctr">
+            <a:noFill/>
+            <a:round/>
+          </a:ln>
+          <a:effectLst/>
+        </c:spPr>
+        <c:txPr>
+          <a:bodyPr rot="-60000000" spcFirstLastPara="1" vertOverflow="ellipsis" vert="horz" wrap="square" anchor="ctr" anchorCtr="1"/>
+          <a:lstStyle/>
+          <a:p>
+            <a:pPr>
+              <a:defRPr sz="1197" b="0" i="0" u="none" strike="noStrike" kern="1200" baseline="0">
+                <a:solidFill>
+                  <a:schemeClr val="tx1">
+                    <a:lumMod val="65000"/>
+                    <a:lumOff val="35000"/>
+                  </a:schemeClr>
+                </a:solidFill>
+                <a:latin typeface="+mn-lt"/>
+                <a:ea typeface="+mn-ea"/>
+                <a:cs typeface="+mn-cs"/>
+              </a:defRPr>
+            </a:pPr>
+            <a:endParaRPr lang="en-US"/>
+          </a:p>
+        </c:txPr>
+        <c:crossAx val="802104479"/>
+        <c:crosses val="autoZero"/>
+        <c:auto val="1"/>
+        <c:lblAlgn val="ctr"/>
+        <c:lblOffset val="100"/>
+        <c:noMultiLvlLbl val="0"/>
+      </c:catAx>
+      <c:valAx>
+        <c:axId val="802104479"/>
+        <c:scaling>
+          <c:orientation val="minMax"/>
+        </c:scaling>
+        <c:delete val="1"/>
+        <c:axPos val="l"/>
+        <c:numFmt formatCode="General" sourceLinked="1"/>
+        <c:majorTickMark val="none"/>
+        <c:minorTickMark val="none"/>
+        <c:tickLblPos val="nextTo"/>
+        <c:crossAx val="802075359"/>
+        <c:crosses val="autoZero"/>
+        <c:crossBetween val="between"/>
+      </c:valAx>
+      <c:spPr>
+        <a:noFill/>
+        <a:ln w="25400">
+          <a:noFill/>
+        </a:ln>
+        <a:effectLst/>
+      </c:spPr>
+    </c:plotArea>
+    <c:plotVisOnly val="1"/>
+    <c:dispBlanksAs val="gap"/>
+    <c:extLst>
+      <c:ext xmlns:c16r3="http://schemas.microsoft.com/office/drawing/2017/03/chart" uri="{56B9EC1D-385E-4148-901F-78D8002777C0}">
+        <c16r3:dataDisplayOptions16>
+          <c16r3:dispNaAsBlank val="1"/>
+        </c16r3:dataDisplayOptions16>
+      </c:ext>
+    </c:extLst>
+    <c:showDLblsOverMax val="0"/>
+  </c:chart>
+  <c:spPr>
+    <a:noFill/>
+    <a:ln>
+      <a:noFill/>
+    </a:ln>
+    <a:effectLst/>
+  </c:spPr>
+  <c:txPr>
+    <a:bodyPr/>
+    <a:lstStyle/>
+    <a:p>
+      <a:pPr>
+        <a:defRPr/>
+      </a:pPr>
+      <a:endParaRPr lang="en-US"/>
+    </a:p>
+  </c:txPr>
+  <c:externalData r:id="rId3">
+    <c:autoUpdate val="0"/>
+  </c:externalData>
+</c:chartSpace>
+</file>
+
 <file path=ppt/charts/colors1.xml><?xml version="1.0" encoding="utf-8"?>
 <cs:colorStyle xmlns:cs="http://schemas.microsoft.com/office/drawing/2012/chartStyle" xmlns:a="http://schemas.openxmlformats.org/drawingml/2006/main" meth="cycle" id="20">
   <a:schemeClr val="dk1"/>
@@ -1176,6 +1481,46 @@
   </cs:variation>
   <cs:variation>
     <a:tint val="80000"/>
+  </cs:variation>
+</cs:colorStyle>
+</file>
+
+<file path=ppt/charts/colors3.xml><?xml version="1.0" encoding="utf-8"?>
+<cs:colorStyle xmlns:cs="http://schemas.microsoft.com/office/drawing/2012/chartStyle" xmlns:a="http://schemas.openxmlformats.org/drawingml/2006/main" meth="cycle" id="10">
+  <a:schemeClr val="accent1"/>
+  <a:schemeClr val="accent2"/>
+  <a:schemeClr val="accent3"/>
+  <a:schemeClr val="accent4"/>
+  <a:schemeClr val="accent5"/>
+  <a:schemeClr val="accent6"/>
+  <cs:variation/>
+  <cs:variation>
+    <a:lumMod val="60000"/>
+  </cs:variation>
+  <cs:variation>
+    <a:lumMod val="80000"/>
+    <a:lumOff val="20000"/>
+  </cs:variation>
+  <cs:variation>
+    <a:lumMod val="80000"/>
+  </cs:variation>
+  <cs:variation>
+    <a:lumMod val="60000"/>
+    <a:lumOff val="40000"/>
+  </cs:variation>
+  <cs:variation>
+    <a:lumMod val="50000"/>
+  </cs:variation>
+  <cs:variation>
+    <a:lumMod val="70000"/>
+    <a:lumOff val="30000"/>
+  </cs:variation>
+  <cs:variation>
+    <a:lumMod val="70000"/>
+  </cs:variation>
+  <cs:variation>
+    <a:lumMod val="50000"/>
+    <a:lumOff val="50000"/>
   </cs:variation>
 </cs:colorStyle>
 </file>
@@ -2182,6 +2527,508 @@
         <a:noFill/>
       </a:ln>
     </cs:spPr>
+  </cs:wall>
+</cs:chartStyle>
+</file>
+
+<file path=ppt/charts/style3.xml><?xml version="1.0" encoding="utf-8"?>
+<cs:chartStyle xmlns:cs="http://schemas.microsoft.com/office/drawing/2012/chartStyle" xmlns:a="http://schemas.openxmlformats.org/drawingml/2006/main" id="340">
+  <cs:axisTitle>
+    <cs:lnRef idx="0"/>
+    <cs:fillRef idx="0"/>
+    <cs:effectRef idx="0"/>
+    <cs:fontRef idx="minor">
+      <a:schemeClr val="tx1">
+        <a:lumMod val="65000"/>
+        <a:lumOff val="35000"/>
+      </a:schemeClr>
+    </cs:fontRef>
+    <cs:defRPr sz="1197" kern="1200"/>
+  </cs:axisTitle>
+  <cs:categoryAxis>
+    <cs:lnRef idx="0"/>
+    <cs:fillRef idx="0"/>
+    <cs:effectRef idx="0"/>
+    <cs:fontRef idx="minor">
+      <a:schemeClr val="tx1">
+        <a:lumMod val="65000"/>
+        <a:lumOff val="35000"/>
+      </a:schemeClr>
+    </cs:fontRef>
+    <cs:spPr>
+      <a:ln w="12700" cap="flat" cmpd="sng" algn="ctr">
+        <a:solidFill>
+          <a:schemeClr val="tx1">
+            <a:lumMod val="15000"/>
+            <a:lumOff val="85000"/>
+          </a:schemeClr>
+        </a:solidFill>
+        <a:round/>
+      </a:ln>
+    </cs:spPr>
+    <cs:defRPr sz="1197" kern="1200"/>
+  </cs:categoryAxis>
+  <cs:chartArea mods="allowNoFillOverride allowNoLineOverride">
+    <cs:lnRef idx="0"/>
+    <cs:fillRef idx="0"/>
+    <cs:effectRef idx="0"/>
+    <cs:fontRef idx="minor">
+      <a:schemeClr val="tx2"/>
+    </cs:fontRef>
+    <cs:spPr>
+      <a:solidFill>
+        <a:schemeClr val="bg1"/>
+      </a:solidFill>
+      <a:ln w="9525" cap="flat" cmpd="sng" algn="ctr">
+        <a:solidFill>
+          <a:schemeClr val="tx1">
+            <a:lumMod val="15000"/>
+            <a:lumOff val="85000"/>
+          </a:schemeClr>
+        </a:solidFill>
+        <a:round/>
+      </a:ln>
+    </cs:spPr>
+    <cs:defRPr sz="1197" kern="1200"/>
+  </cs:chartArea>
+  <cs:dataLabel>
+    <cs:lnRef idx="0"/>
+    <cs:fillRef idx="0"/>
+    <cs:effectRef idx="0"/>
+    <cs:fontRef idx="minor">
+      <a:schemeClr val="tx1">
+        <a:lumMod val="75000"/>
+        <a:lumOff val="25000"/>
+      </a:schemeClr>
+    </cs:fontRef>
+    <cs:defRPr sz="1197" kern="1200"/>
+  </cs:dataLabel>
+  <cs:dataLabelCallout>
+    <cs:lnRef idx="0"/>
+    <cs:fillRef idx="0"/>
+    <cs:effectRef idx="0"/>
+    <cs:fontRef idx="minor">
+      <a:schemeClr val="dk1">
+        <a:lumMod val="65000"/>
+        <a:lumOff val="35000"/>
+      </a:schemeClr>
+    </cs:fontRef>
+    <cs:spPr>
+      <a:solidFill>
+        <a:schemeClr val="lt1"/>
+      </a:solidFill>
+      <a:ln>
+        <a:solidFill>
+          <a:schemeClr val="dk1">
+            <a:lumMod val="25000"/>
+            <a:lumOff val="75000"/>
+          </a:schemeClr>
+        </a:solidFill>
+      </a:ln>
+    </cs:spPr>
+    <cs:defRPr sz="1197" kern="1200"/>
+    <cs:bodyPr rot="0" spcFirstLastPara="1" vertOverflow="clip" horzOverflow="clip" vert="horz" wrap="square" lIns="36576" tIns="18288" rIns="36576" bIns="18288" anchor="ctr" anchorCtr="1">
+      <a:spAutoFit/>
+    </cs:bodyPr>
+  </cs:dataLabelCallout>
+  <cs:dataPoint>
+    <cs:lnRef idx="0"/>
+    <cs:fillRef idx="3">
+      <cs:styleClr val="auto"/>
+    </cs:fillRef>
+    <cs:effectRef idx="3"/>
+    <cs:fontRef idx="minor">
+      <a:schemeClr val="lt1"/>
+    </cs:fontRef>
+  </cs:dataPoint>
+  <cs:dataPoint3D>
+    <cs:lnRef idx="0"/>
+    <cs:fillRef idx="3">
+      <cs:styleClr val="auto"/>
+    </cs:fillRef>
+    <cs:effectRef idx="3"/>
+    <cs:fontRef idx="minor">
+      <a:schemeClr val="lt1"/>
+    </cs:fontRef>
+  </cs:dataPoint3D>
+  <cs:dataPointLine>
+    <cs:lnRef idx="0">
+      <cs:styleClr val="auto"/>
+    </cs:lnRef>
+    <cs:fillRef idx="3"/>
+    <cs:effectRef idx="3"/>
+    <cs:fontRef idx="minor">
+      <a:schemeClr val="lt1"/>
+    </cs:fontRef>
+    <cs:spPr>
+      <a:ln w="34925" cap="rnd">
+        <a:solidFill>
+          <a:schemeClr val="phClr"/>
+        </a:solidFill>
+        <a:round/>
+      </a:ln>
+    </cs:spPr>
+  </cs:dataPointLine>
+  <cs:dataPointMarker>
+    <cs:lnRef idx="0">
+      <cs:styleClr val="auto"/>
+    </cs:lnRef>
+    <cs:fillRef idx="3">
+      <cs:styleClr val="auto"/>
+    </cs:fillRef>
+    <cs:effectRef idx="3"/>
+    <cs:fontRef idx="minor">
+      <a:schemeClr val="lt1"/>
+    </cs:fontRef>
+    <cs:spPr>
+      <a:ln w="9525">
+        <a:solidFill>
+          <a:schemeClr val="phClr"/>
+        </a:solidFill>
+        <a:round/>
+      </a:ln>
+    </cs:spPr>
+  </cs:dataPointMarker>
+  <cs:dataPointMarkerLayout symbol="circle" size="6"/>
+  <cs:dataPointWireframe>
+    <cs:lnRef idx="0">
+      <cs:styleClr val="auto"/>
+    </cs:lnRef>
+    <cs:fillRef idx="3"/>
+    <cs:effectRef idx="3"/>
+    <cs:fontRef idx="minor">
+      <a:schemeClr val="lt1"/>
+    </cs:fontRef>
+    <cs:spPr>
+      <a:ln w="9525" cap="rnd">
+        <a:solidFill>
+          <a:schemeClr val="phClr"/>
+        </a:solidFill>
+        <a:round/>
+      </a:ln>
+    </cs:spPr>
+  </cs:dataPointWireframe>
+  <cs:dataTable>
+    <cs:lnRef idx="0"/>
+    <cs:fillRef idx="0"/>
+    <cs:effectRef idx="0"/>
+    <cs:fontRef idx="minor">
+      <a:schemeClr val="tx1">
+        <a:lumMod val="65000"/>
+        <a:lumOff val="35000"/>
+      </a:schemeClr>
+    </cs:fontRef>
+    <cs:spPr>
+      <a:noFill/>
+      <a:ln w="9525" cap="flat" cmpd="sng" algn="ctr">
+        <a:solidFill>
+          <a:schemeClr val="tx1">
+            <a:lumMod val="15000"/>
+            <a:lumOff val="85000"/>
+          </a:schemeClr>
+        </a:solidFill>
+        <a:round/>
+      </a:ln>
+    </cs:spPr>
+    <cs:defRPr sz="1197" kern="1200"/>
+  </cs:dataTable>
+  <cs:downBar>
+    <cs:lnRef idx="0"/>
+    <cs:fillRef idx="0"/>
+    <cs:effectRef idx="0"/>
+    <cs:fontRef idx="minor">
+      <a:schemeClr val="dk1"/>
+    </cs:fontRef>
+    <cs:spPr>
+      <a:solidFill>
+        <a:schemeClr val="dk1">
+          <a:lumMod val="65000"/>
+          <a:lumOff val="35000"/>
+        </a:schemeClr>
+      </a:solidFill>
+      <a:ln w="9525">
+        <a:solidFill>
+          <a:schemeClr val="tx1">
+            <a:lumMod val="65000"/>
+            <a:lumOff val="35000"/>
+          </a:schemeClr>
+        </a:solidFill>
+      </a:ln>
+    </cs:spPr>
+  </cs:downBar>
+  <cs:dropLine>
+    <cs:lnRef idx="0"/>
+    <cs:fillRef idx="0"/>
+    <cs:effectRef idx="0"/>
+    <cs:fontRef idx="minor">
+      <a:schemeClr val="tx1"/>
+    </cs:fontRef>
+    <cs:spPr>
+      <a:ln w="9525" cap="flat" cmpd="sng" algn="ctr">
+        <a:solidFill>
+          <a:schemeClr val="tx1">
+            <a:lumMod val="35000"/>
+            <a:lumOff val="65000"/>
+          </a:schemeClr>
+        </a:solidFill>
+        <a:round/>
+      </a:ln>
+    </cs:spPr>
+  </cs:dropLine>
+  <cs:errorBar>
+    <cs:lnRef idx="0"/>
+    <cs:fillRef idx="0"/>
+    <cs:effectRef idx="0"/>
+    <cs:fontRef idx="minor">
+      <a:schemeClr val="tx1"/>
+    </cs:fontRef>
+    <cs:spPr>
+      <a:ln w="9525" cap="flat" cmpd="sng" algn="ctr">
+        <a:solidFill>
+          <a:schemeClr val="tx1">
+            <a:lumMod val="65000"/>
+            <a:lumOff val="35000"/>
+          </a:schemeClr>
+        </a:solidFill>
+        <a:round/>
+      </a:ln>
+    </cs:spPr>
+  </cs:errorBar>
+  <cs:floor>
+    <cs:lnRef idx="0"/>
+    <cs:fillRef idx="0"/>
+    <cs:effectRef idx="0"/>
+    <cs:fontRef idx="minor">
+      <a:schemeClr val="lt1"/>
+    </cs:fontRef>
+  </cs:floor>
+  <cs:gridlineMajor>
+    <cs:lnRef idx="0"/>
+    <cs:fillRef idx="0"/>
+    <cs:effectRef idx="0"/>
+    <cs:fontRef idx="minor">
+      <a:schemeClr val="tx1"/>
+    </cs:fontRef>
+    <cs:spPr>
+      <a:ln w="9525" cap="flat" cmpd="sng" algn="ctr">
+        <a:solidFill>
+          <a:schemeClr val="tx1">
+            <a:lumMod val="15000"/>
+            <a:lumOff val="85000"/>
+          </a:schemeClr>
+        </a:solidFill>
+        <a:round/>
+      </a:ln>
+    </cs:spPr>
+  </cs:gridlineMajor>
+  <cs:gridlineMinor>
+    <cs:lnRef idx="0"/>
+    <cs:fillRef idx="0"/>
+    <cs:effectRef idx="0"/>
+    <cs:fontRef idx="minor">
+      <a:schemeClr val="tx1"/>
+    </cs:fontRef>
+    <cs:spPr>
+      <a:ln w="9525" cap="flat" cmpd="sng" algn="ctr">
+        <a:solidFill>
+          <a:schemeClr val="tx1">
+            <a:lumMod val="5000"/>
+            <a:lumOff val="95000"/>
+          </a:schemeClr>
+        </a:solidFill>
+        <a:round/>
+      </a:ln>
+    </cs:spPr>
+  </cs:gridlineMinor>
+  <cs:hiLoLine>
+    <cs:lnRef idx="0"/>
+    <cs:fillRef idx="0"/>
+    <cs:effectRef idx="0"/>
+    <cs:fontRef idx="minor">
+      <a:schemeClr val="tx1"/>
+    </cs:fontRef>
+    <cs:spPr>
+      <a:ln w="9525" cap="flat" cmpd="sng" algn="ctr">
+        <a:solidFill>
+          <a:schemeClr val="tx1">
+            <a:lumMod val="75000"/>
+            <a:lumOff val="25000"/>
+          </a:schemeClr>
+        </a:solidFill>
+        <a:round/>
+      </a:ln>
+    </cs:spPr>
+  </cs:hiLoLine>
+  <cs:leaderLine>
+    <cs:lnRef idx="0"/>
+    <cs:fillRef idx="0"/>
+    <cs:effectRef idx="0"/>
+    <cs:fontRef idx="minor">
+      <a:schemeClr val="tx1"/>
+    </cs:fontRef>
+    <cs:spPr>
+      <a:ln w="9525" cap="flat" cmpd="sng" algn="ctr">
+        <a:solidFill>
+          <a:schemeClr val="tx1">
+            <a:lumMod val="35000"/>
+            <a:lumOff val="65000"/>
+          </a:schemeClr>
+        </a:solidFill>
+        <a:round/>
+      </a:ln>
+    </cs:spPr>
+  </cs:leaderLine>
+  <cs:legend>
+    <cs:lnRef idx="0"/>
+    <cs:fillRef idx="0"/>
+    <cs:effectRef idx="0"/>
+    <cs:fontRef idx="minor">
+      <a:schemeClr val="tx1">
+        <a:lumMod val="65000"/>
+        <a:lumOff val="35000"/>
+      </a:schemeClr>
+    </cs:fontRef>
+    <cs:defRPr sz="1197" kern="1200"/>
+  </cs:legend>
+  <cs:plotArea>
+    <cs:lnRef idx="0"/>
+    <cs:fillRef idx="0"/>
+    <cs:effectRef idx="0"/>
+    <cs:fontRef idx="minor">
+      <a:schemeClr val="lt1"/>
+    </cs:fontRef>
+  </cs:plotArea>
+  <cs:plotArea3D>
+    <cs:lnRef idx="0"/>
+    <cs:fillRef idx="0"/>
+    <cs:effectRef idx="0"/>
+    <cs:fontRef idx="minor">
+      <a:schemeClr val="lt1"/>
+    </cs:fontRef>
+  </cs:plotArea3D>
+  <cs:seriesAxis>
+    <cs:lnRef idx="0"/>
+    <cs:fillRef idx="0"/>
+    <cs:effectRef idx="0"/>
+    <cs:fontRef idx="minor">
+      <a:schemeClr val="tx1">
+        <a:lumMod val="65000"/>
+        <a:lumOff val="35000"/>
+      </a:schemeClr>
+    </cs:fontRef>
+    <cs:spPr>
+      <a:ln w="12700" cap="flat" cmpd="sng" algn="ctr">
+        <a:solidFill>
+          <a:schemeClr val="tx1">
+            <a:lumMod val="15000"/>
+            <a:lumOff val="85000"/>
+          </a:schemeClr>
+        </a:solidFill>
+        <a:round/>
+      </a:ln>
+    </cs:spPr>
+    <cs:defRPr sz="1197" kern="1200"/>
+  </cs:seriesAxis>
+  <cs:seriesLine>
+    <cs:lnRef idx="0"/>
+    <cs:fillRef idx="0"/>
+    <cs:effectRef idx="0"/>
+    <cs:fontRef idx="minor">
+      <a:schemeClr val="tx1"/>
+    </cs:fontRef>
+    <cs:spPr>
+      <a:ln w="9525" cap="flat" cmpd="sng" algn="ctr">
+        <a:solidFill>
+          <a:schemeClr val="tx1">
+            <a:lumMod val="35000"/>
+            <a:lumOff val="65000"/>
+          </a:schemeClr>
+        </a:solidFill>
+        <a:round/>
+      </a:ln>
+    </cs:spPr>
+  </cs:seriesLine>
+  <cs:title>
+    <cs:lnRef idx="0"/>
+    <cs:fillRef idx="0"/>
+    <cs:effectRef idx="0"/>
+    <cs:fontRef idx="minor">
+      <a:schemeClr val="tx1">
+        <a:lumMod val="65000"/>
+        <a:lumOff val="35000"/>
+      </a:schemeClr>
+    </cs:fontRef>
+    <cs:defRPr sz="2128" b="1" kern="1200" baseline="0"/>
+  </cs:title>
+  <cs:trendline>
+    <cs:lnRef idx="0">
+      <cs:styleClr val="auto"/>
+    </cs:lnRef>
+    <cs:fillRef idx="0"/>
+    <cs:effectRef idx="0"/>
+    <cs:fontRef idx="minor">
+      <a:schemeClr val="lt1"/>
+    </cs:fontRef>
+    <cs:spPr>
+      <a:ln w="19050" cap="rnd">
+        <a:solidFill>
+          <a:schemeClr val="phClr"/>
+        </a:solidFill>
+      </a:ln>
+    </cs:spPr>
+  </cs:trendline>
+  <cs:trendlineLabel>
+    <cs:lnRef idx="0"/>
+    <cs:fillRef idx="0"/>
+    <cs:effectRef idx="0"/>
+    <cs:fontRef idx="minor">
+      <a:schemeClr val="tx1">
+        <a:lumMod val="65000"/>
+        <a:lumOff val="35000"/>
+      </a:schemeClr>
+    </cs:fontRef>
+    <cs:defRPr sz="1197" kern="1200"/>
+  </cs:trendlineLabel>
+  <cs:upBar>
+    <cs:lnRef idx="0"/>
+    <cs:fillRef idx="0"/>
+    <cs:effectRef idx="0"/>
+    <cs:fontRef idx="minor">
+      <a:schemeClr val="dk1"/>
+    </cs:fontRef>
+    <cs:spPr>
+      <a:solidFill>
+        <a:schemeClr val="lt1"/>
+      </a:solidFill>
+      <a:ln w="9525">
+        <a:solidFill>
+          <a:schemeClr val="tx1">
+            <a:lumMod val="15000"/>
+            <a:lumOff val="85000"/>
+          </a:schemeClr>
+        </a:solidFill>
+      </a:ln>
+    </cs:spPr>
+  </cs:upBar>
+  <cs:valueAxis>
+    <cs:lnRef idx="0"/>
+    <cs:fillRef idx="0"/>
+    <cs:effectRef idx="0"/>
+    <cs:fontRef idx="minor">
+      <a:schemeClr val="tx1">
+        <a:lumMod val="65000"/>
+        <a:lumOff val="35000"/>
+      </a:schemeClr>
+    </cs:fontRef>
+    <cs:defRPr sz="1197" kern="1200"/>
+  </cs:valueAxis>
+  <cs:wall>
+    <cs:lnRef idx="0"/>
+    <cs:fillRef idx="0"/>
+    <cs:effectRef idx="0"/>
+    <cs:fontRef idx="minor">
+      <a:schemeClr val="lt1"/>
+    </cs:fontRef>
   </cs:wall>
 </cs:chartStyle>
 </file>
@@ -8735,7 +9582,7 @@
               <a:rPr lang="en-US" smtClean="0">
                 <a:latin typeface="Segoe UI" pitchFamily="34" charset="0"/>
               </a:rPr>
-              <a:t>11/17/2022 3:10 PM</a:t>
+              <a:t>11/25/2022 3:37 PM</a:t>
             </a:fld>
             <a:endParaRPr lang="en-US" dirty="0">
               <a:latin typeface="Segoe UI" pitchFamily="34" charset="0"/>
@@ -9016,7 +9863,7 @@
           <a:p>
             <a:fld id="{38EEC551-8CDA-4EB6-89BB-2A86C9F091C8}" type="datetime8">
               <a:rPr lang="en-US" smtClean="0"/>
-              <a:t>11/17/2022 3:10 PM</a:t>
+              <a:t>11/25/2022 3:37 PM</a:t>
             </a:fld>
             <a:endParaRPr lang="en-US" dirty="0"/>
           </a:p>
@@ -9552,6 +10399,376 @@
 </p:notes>
 </file>
 
+<file path=ppt/notesSlides/notesSlide11.xml><?xml version="1.0" encoding="utf-8"?>
+<p:notes xmlns:a="http://schemas.openxmlformats.org/drawingml/2006/main" xmlns:r="http://schemas.openxmlformats.org/officeDocument/2006/relationships" xmlns:p="http://schemas.openxmlformats.org/presentationml/2006/main">
+  <p:cSld>
+    <p:spTree>
+      <p:nvGrpSpPr>
+        <p:cNvPr id="1" name=""/>
+        <p:cNvGrpSpPr/>
+        <p:nvPr/>
+      </p:nvGrpSpPr>
+      <p:grpSpPr>
+        <a:xfrm>
+          <a:off x="0" y="0"/>
+          <a:ext cx="0" cy="0"/>
+          <a:chOff x="0" y="0"/>
+          <a:chExt cx="0" cy="0"/>
+        </a:xfrm>
+      </p:grpSpPr>
+      <p:sp>
+        <p:nvSpPr>
+          <p:cNvPr id="2" name="Slide Image Placeholder 1"/>
+          <p:cNvSpPr>
+            <a:spLocks noGrp="1" noRot="1" noChangeAspect="1"/>
+          </p:cNvSpPr>
+          <p:nvPr>
+            <p:ph type="sldImg"/>
+          </p:nvPr>
+        </p:nvSpPr>
+        <p:spPr/>
+      </p:sp>
+      <p:sp>
+        <p:nvSpPr>
+          <p:cNvPr id="3" name="Notes Placeholder 2"/>
+          <p:cNvSpPr>
+            <a:spLocks noGrp="1"/>
+          </p:cNvSpPr>
+          <p:nvPr>
+            <p:ph type="body" idx="1"/>
+          </p:nvPr>
+        </p:nvSpPr>
+        <p:spPr/>
+        <p:txBody>
+          <a:bodyPr/>
+          <a:lstStyle/>
+          <a:p>
+            <a:endParaRPr lang="en-US" dirty="0"/>
+          </a:p>
+        </p:txBody>
+      </p:sp>
+      <p:sp>
+        <p:nvSpPr>
+          <p:cNvPr id="4" name="Header Placeholder 3"/>
+          <p:cNvSpPr>
+            <a:spLocks noGrp="1"/>
+          </p:cNvSpPr>
+          <p:nvPr>
+            <p:ph type="hdr" sz="quarter"/>
+          </p:nvPr>
+        </p:nvSpPr>
+        <p:spPr/>
+        <p:txBody>
+          <a:bodyPr/>
+          <a:lstStyle/>
+          <a:p>
+            <a:r>
+              <a:rPr lang="en-US"/>
+              <a:t>Microsoft Ignite 2016</a:t>
+            </a:r>
+            <a:endParaRPr lang="en-US" dirty="0"/>
+          </a:p>
+        </p:txBody>
+      </p:sp>
+      <p:sp>
+        <p:nvSpPr>
+          <p:cNvPr id="5" name="Footer Placeholder 4"/>
+          <p:cNvSpPr>
+            <a:spLocks noGrp="1"/>
+          </p:cNvSpPr>
+          <p:nvPr>
+            <p:ph type="ftr" sz="quarter" idx="4"/>
+          </p:nvPr>
+        </p:nvSpPr>
+        <p:spPr/>
+        <p:txBody>
+          <a:bodyPr/>
+          <a:lstStyle/>
+          <a:p>
+            <a:pPr defTabSz="914099" eaLnBrk="0" hangingPunct="0"/>
+            <a:r>
+              <a:rPr lang="en-US" sz="400">
+                <a:gradFill>
+                  <a:gsLst>
+                    <a:gs pos="0">
+                      <a:prstClr val="black"/>
+                    </a:gs>
+                    <a:gs pos="100000">
+                      <a:prstClr val="black"/>
+                    </a:gs>
+                  </a:gsLst>
+                  <a:lin ang="5400000" scaled="0"/>
+                </a:gradFill>
+                <a:latin typeface="Segoe UI" pitchFamily="34" charset="0"/>
+                <a:ea typeface="Segoe UI" pitchFamily="34" charset="0"/>
+                <a:cs typeface="Segoe UI" pitchFamily="34" charset="0"/>
+              </a:rPr>
+              <a:t>© 2016 Microsoft Corporation. All rights reserved. MICROSOFT MAKES NO WARRANTIES, EXPRESS, IMPLIED OR STATUTORY, AS TO THE INFORMATION IN THIS PRESENTATION.</a:t>
+            </a:r>
+            <a:endParaRPr lang="en-US" sz="400" dirty="0">
+              <a:gradFill>
+                <a:gsLst>
+                  <a:gs pos="0">
+                    <a:prstClr val="black"/>
+                  </a:gs>
+                  <a:gs pos="100000">
+                    <a:prstClr val="black"/>
+                  </a:gs>
+                </a:gsLst>
+                <a:lin ang="5400000" scaled="0"/>
+              </a:gradFill>
+              <a:latin typeface="Segoe UI" pitchFamily="34" charset="0"/>
+              <a:ea typeface="Segoe UI" pitchFamily="34" charset="0"/>
+              <a:cs typeface="Segoe UI" pitchFamily="34" charset="0"/>
+            </a:endParaRPr>
+          </a:p>
+        </p:txBody>
+      </p:sp>
+      <p:sp>
+        <p:nvSpPr>
+          <p:cNvPr id="6" name="Date Placeholder 5"/>
+          <p:cNvSpPr>
+            <a:spLocks noGrp="1"/>
+          </p:cNvSpPr>
+          <p:nvPr>
+            <p:ph type="dt" idx="1"/>
+          </p:nvPr>
+        </p:nvSpPr>
+        <p:spPr/>
+        <p:txBody>
+          <a:bodyPr/>
+          <a:lstStyle/>
+          <a:p>
+            <a:fld id="{38EEC551-8CDA-4EB6-89BB-2A86C9F091C8}" type="datetime8">
+              <a:rPr lang="en-US" smtClean="0"/>
+              <a:t>11/25/2022 3:37 PM</a:t>
+            </a:fld>
+            <a:endParaRPr lang="en-US" dirty="0"/>
+          </a:p>
+        </p:txBody>
+      </p:sp>
+      <p:sp>
+        <p:nvSpPr>
+          <p:cNvPr id="7" name="Slide Number Placeholder 6"/>
+          <p:cNvSpPr>
+            <a:spLocks noGrp="1"/>
+          </p:cNvSpPr>
+          <p:nvPr>
+            <p:ph type="sldNum" sz="quarter" idx="5"/>
+          </p:nvPr>
+        </p:nvSpPr>
+        <p:spPr/>
+        <p:txBody>
+          <a:bodyPr/>
+          <a:lstStyle/>
+          <a:p>
+            <a:fld id="{B4008EB6-D09E-4580-8CD6-DDB14511944F}" type="slidenum">
+              <a:rPr lang="en-US" smtClean="0"/>
+              <a:pPr/>
+              <a:t>14</a:t>
+            </a:fld>
+            <a:endParaRPr lang="en-US" dirty="0"/>
+          </a:p>
+        </p:txBody>
+      </p:sp>
+    </p:spTree>
+    <p:extLst>
+      <p:ext uri="{BB962C8B-B14F-4D97-AF65-F5344CB8AC3E}">
+        <p14:creationId xmlns:p14="http://schemas.microsoft.com/office/powerpoint/2010/main" val="2014092628"/>
+      </p:ext>
+    </p:extLst>
+  </p:cSld>
+  <p:clrMapOvr>
+    <a:masterClrMapping/>
+  </p:clrMapOvr>
+</p:notes>
+</file>
+
+<file path=ppt/notesSlides/notesSlide12.xml><?xml version="1.0" encoding="utf-8"?>
+<p:notes xmlns:a="http://schemas.openxmlformats.org/drawingml/2006/main" xmlns:r="http://schemas.openxmlformats.org/officeDocument/2006/relationships" xmlns:p="http://schemas.openxmlformats.org/presentationml/2006/main">
+  <p:cSld>
+    <p:spTree>
+      <p:nvGrpSpPr>
+        <p:cNvPr id="1" name=""/>
+        <p:cNvGrpSpPr/>
+        <p:nvPr/>
+      </p:nvGrpSpPr>
+      <p:grpSpPr>
+        <a:xfrm>
+          <a:off x="0" y="0"/>
+          <a:ext cx="0" cy="0"/>
+          <a:chOff x="0" y="0"/>
+          <a:chExt cx="0" cy="0"/>
+        </a:xfrm>
+      </p:grpSpPr>
+      <p:sp>
+        <p:nvSpPr>
+          <p:cNvPr id="2" name="Slide Image Placeholder 1"/>
+          <p:cNvSpPr>
+            <a:spLocks noGrp="1" noRot="1" noChangeAspect="1"/>
+          </p:cNvSpPr>
+          <p:nvPr>
+            <p:ph type="sldImg"/>
+          </p:nvPr>
+        </p:nvSpPr>
+        <p:spPr/>
+      </p:sp>
+      <p:sp>
+        <p:nvSpPr>
+          <p:cNvPr id="3" name="Notes Placeholder 2"/>
+          <p:cNvSpPr>
+            <a:spLocks noGrp="1"/>
+          </p:cNvSpPr>
+          <p:nvPr>
+            <p:ph type="body" idx="1"/>
+          </p:nvPr>
+        </p:nvSpPr>
+        <p:spPr/>
+        <p:txBody>
+          <a:bodyPr/>
+          <a:lstStyle/>
+          <a:p>
+            <a:endParaRPr lang="en-US" dirty="0"/>
+          </a:p>
+        </p:txBody>
+      </p:sp>
+      <p:sp>
+        <p:nvSpPr>
+          <p:cNvPr id="4" name="Header Placeholder 3"/>
+          <p:cNvSpPr>
+            <a:spLocks noGrp="1"/>
+          </p:cNvSpPr>
+          <p:nvPr>
+            <p:ph type="hdr" sz="quarter"/>
+          </p:nvPr>
+        </p:nvSpPr>
+        <p:spPr/>
+        <p:txBody>
+          <a:bodyPr/>
+          <a:lstStyle/>
+          <a:p>
+            <a:r>
+              <a:rPr lang="en-US"/>
+              <a:t>Microsoft Ignite 2016</a:t>
+            </a:r>
+            <a:endParaRPr lang="en-US" dirty="0"/>
+          </a:p>
+        </p:txBody>
+      </p:sp>
+      <p:sp>
+        <p:nvSpPr>
+          <p:cNvPr id="5" name="Footer Placeholder 4"/>
+          <p:cNvSpPr>
+            <a:spLocks noGrp="1"/>
+          </p:cNvSpPr>
+          <p:nvPr>
+            <p:ph type="ftr" sz="quarter" idx="4"/>
+          </p:nvPr>
+        </p:nvSpPr>
+        <p:spPr/>
+        <p:txBody>
+          <a:bodyPr/>
+          <a:lstStyle/>
+          <a:p>
+            <a:pPr defTabSz="914099" eaLnBrk="0" hangingPunct="0"/>
+            <a:r>
+              <a:rPr lang="en-US" sz="400">
+                <a:gradFill>
+                  <a:gsLst>
+                    <a:gs pos="0">
+                      <a:prstClr val="black"/>
+                    </a:gs>
+                    <a:gs pos="100000">
+                      <a:prstClr val="black"/>
+                    </a:gs>
+                  </a:gsLst>
+                  <a:lin ang="5400000" scaled="0"/>
+                </a:gradFill>
+                <a:latin typeface="Segoe UI" pitchFamily="34" charset="0"/>
+                <a:ea typeface="Segoe UI" pitchFamily="34" charset="0"/>
+                <a:cs typeface="Segoe UI" pitchFamily="34" charset="0"/>
+              </a:rPr>
+              <a:t>© 2016 Microsoft Corporation. All rights reserved. MICROSOFT MAKES NO WARRANTIES, EXPRESS, IMPLIED OR STATUTORY, AS TO THE INFORMATION IN THIS PRESENTATION.</a:t>
+            </a:r>
+            <a:endParaRPr lang="en-US" sz="400" dirty="0">
+              <a:gradFill>
+                <a:gsLst>
+                  <a:gs pos="0">
+                    <a:prstClr val="black"/>
+                  </a:gs>
+                  <a:gs pos="100000">
+                    <a:prstClr val="black"/>
+                  </a:gs>
+                </a:gsLst>
+                <a:lin ang="5400000" scaled="0"/>
+              </a:gradFill>
+              <a:latin typeface="Segoe UI" pitchFamily="34" charset="0"/>
+              <a:ea typeface="Segoe UI" pitchFamily="34" charset="0"/>
+              <a:cs typeface="Segoe UI" pitchFamily="34" charset="0"/>
+            </a:endParaRPr>
+          </a:p>
+        </p:txBody>
+      </p:sp>
+      <p:sp>
+        <p:nvSpPr>
+          <p:cNvPr id="6" name="Date Placeholder 5"/>
+          <p:cNvSpPr>
+            <a:spLocks noGrp="1"/>
+          </p:cNvSpPr>
+          <p:nvPr>
+            <p:ph type="dt" idx="1"/>
+          </p:nvPr>
+        </p:nvSpPr>
+        <p:spPr/>
+        <p:txBody>
+          <a:bodyPr/>
+          <a:lstStyle/>
+          <a:p>
+            <a:fld id="{38EEC551-8CDA-4EB6-89BB-2A86C9F091C8}" type="datetime8">
+              <a:rPr lang="en-US" smtClean="0"/>
+              <a:t>11/25/2022 3:37 PM</a:t>
+            </a:fld>
+            <a:endParaRPr lang="en-US" dirty="0"/>
+          </a:p>
+        </p:txBody>
+      </p:sp>
+      <p:sp>
+        <p:nvSpPr>
+          <p:cNvPr id="7" name="Slide Number Placeholder 6"/>
+          <p:cNvSpPr>
+            <a:spLocks noGrp="1"/>
+          </p:cNvSpPr>
+          <p:nvPr>
+            <p:ph type="sldNum" sz="quarter" idx="5"/>
+          </p:nvPr>
+        </p:nvSpPr>
+        <p:spPr/>
+        <p:txBody>
+          <a:bodyPr/>
+          <a:lstStyle/>
+          <a:p>
+            <a:fld id="{B4008EB6-D09E-4580-8CD6-DDB14511944F}" type="slidenum">
+              <a:rPr lang="en-US" smtClean="0"/>
+              <a:pPr/>
+              <a:t>15</a:t>
+            </a:fld>
+            <a:endParaRPr lang="en-US" dirty="0"/>
+          </a:p>
+        </p:txBody>
+      </p:sp>
+    </p:spTree>
+    <p:extLst>
+      <p:ext uri="{BB962C8B-B14F-4D97-AF65-F5344CB8AC3E}">
+        <p14:creationId xmlns:p14="http://schemas.microsoft.com/office/powerpoint/2010/main" val="3846833053"/>
+      </p:ext>
+    </p:extLst>
+  </p:cSld>
+  <p:clrMapOvr>
+    <a:masterClrMapping/>
+  </p:clrMapOvr>
+</p:notes>
+</file>
+
 <file path=ppt/notesSlides/notesSlide2.xml><?xml version="1.0" encoding="utf-8"?>
 <p:notes xmlns:a="http://schemas.openxmlformats.org/drawingml/2006/main" xmlns:r="http://schemas.openxmlformats.org/officeDocument/2006/relationships" xmlns:p="http://schemas.openxmlformats.org/presentationml/2006/main">
   <p:cSld>
@@ -11515,7 +12732,7 @@
           <a:p>
             <a:fld id="{F8E97784-E3E6-405D-A188-BB21A2BFA422}" type="datetimeFigureOut">
               <a:rPr lang="en-US" smtClean="0"/>
-              <a:t>11/17/2022</a:t>
+              <a:t>11/25/2022</a:t>
             </a:fld>
             <a:endParaRPr lang="en-US"/>
           </a:p>
@@ -15206,7 +16423,7 @@
           <a:p>
             <a:fld id="{0A627400-D089-7447-864B-77479EBD4214}" type="datetimeFigureOut">
               <a:rPr lang="en-US" smtClean="0"/>
-              <a:t>11/17/2022</a:t>
+              <a:t>11/25/2022</a:t>
             </a:fld>
             <a:endParaRPr lang="en-US"/>
           </a:p>
@@ -15404,7 +16621,7 @@
           <a:p>
             <a:fld id="{0A627400-D089-7447-864B-77479EBD4214}" type="datetimeFigureOut">
               <a:rPr lang="en-US" smtClean="0"/>
-              <a:t>11/17/2022</a:t>
+              <a:t>11/25/2022</a:t>
             </a:fld>
             <a:endParaRPr lang="en-US"/>
           </a:p>
@@ -15679,7 +16896,7 @@
           <a:p>
             <a:fld id="{0A627400-D089-7447-864B-77479EBD4214}" type="datetimeFigureOut">
               <a:rPr lang="en-US" smtClean="0"/>
-              <a:t>11/17/2022</a:t>
+              <a:t>11/25/2022</a:t>
             </a:fld>
             <a:endParaRPr lang="en-US"/>
           </a:p>
@@ -15947,7 +17164,7 @@
           <a:p>
             <a:fld id="{0A627400-D089-7447-864B-77479EBD4214}" type="datetimeFigureOut">
               <a:rPr lang="en-US" smtClean="0"/>
-              <a:t>11/17/2022</a:t>
+              <a:t>11/25/2022</a:t>
             </a:fld>
             <a:endParaRPr lang="en-US"/>
           </a:p>
@@ -16359,7 +17576,7 @@
           <a:p>
             <a:fld id="{0A627400-D089-7447-864B-77479EBD4214}" type="datetimeFigureOut">
               <a:rPr lang="en-US" smtClean="0"/>
-              <a:t>11/17/2022</a:t>
+              <a:t>11/25/2022</a:t>
             </a:fld>
             <a:endParaRPr lang="en-US"/>
           </a:p>
@@ -16565,7 +17782,7 @@
           <a:p>
             <a:fld id="{0A627400-D089-7447-864B-77479EBD4214}" type="datetimeFigureOut">
               <a:rPr lang="en-US" smtClean="0"/>
-              <a:t>11/17/2022</a:t>
+              <a:t>11/25/2022</a:t>
             </a:fld>
             <a:endParaRPr lang="en-US"/>
           </a:p>
@@ -16679,7 +17896,7 @@
             <a:fld id="{0A627400-D089-7447-864B-77479EBD4214}" type="datetimeFigureOut">
               <a:rPr lang="en-US" smtClean="0"/>
               <a:pPr/>
-              <a:t>11/17/2022</a:t>
+              <a:t>11/25/2022</a:t>
             </a:fld>
             <a:endParaRPr lang="en-US"/>
           </a:p>
@@ -16844,7 +18061,7 @@
             <a:fld id="{0A627400-D089-7447-864B-77479EBD4214}" type="datetimeFigureOut">
               <a:rPr lang="en-US" smtClean="0"/>
               <a:pPr/>
-              <a:t>11/17/2022</a:t>
+              <a:t>11/25/2022</a:t>
             </a:fld>
             <a:endParaRPr lang="en-US"/>
           </a:p>
@@ -17095,7 +18312,7 @@
           <a:p>
             <a:fld id="{0A627400-D089-7447-864B-77479EBD4214}" type="datetimeFigureOut">
               <a:rPr lang="en-US" smtClean="0"/>
-              <a:t>11/17/2022</a:t>
+              <a:t>11/25/2022</a:t>
             </a:fld>
             <a:endParaRPr lang="en-US"/>
           </a:p>
@@ -17666,7 +18883,7 @@
           <a:p>
             <a:fld id="{0A627400-D089-7447-864B-77479EBD4214}" type="datetimeFigureOut">
               <a:rPr lang="en-US" smtClean="0"/>
-              <a:t>11/17/2022</a:t>
+              <a:t>11/25/2022</a:t>
             </a:fld>
             <a:endParaRPr lang="en-US"/>
           </a:p>
@@ -17977,7 +19194,7 @@
           <a:p>
             <a:fld id="{0A627400-D089-7447-864B-77479EBD4214}" type="datetimeFigureOut">
               <a:rPr lang="en-US" smtClean="0"/>
-              <a:t>11/17/2022</a:t>
+              <a:t>11/25/2022</a:t>
             </a:fld>
             <a:endParaRPr lang="en-US"/>
           </a:p>
@@ -18265,7 +19482,7 @@
           <a:p>
             <a:fld id="{0A627400-D089-7447-864B-77479EBD4214}" type="datetimeFigureOut">
               <a:rPr lang="en-US" smtClean="0"/>
-              <a:t>11/17/2022</a:t>
+              <a:t>11/25/2022</a:t>
             </a:fld>
             <a:endParaRPr lang="en-US"/>
           </a:p>
@@ -19446,7 +20663,7 @@
           <a:p>
             <a:fld id="{0A627400-D089-7447-864B-77479EBD4214}" type="datetimeFigureOut">
               <a:rPr lang="en-US" smtClean="0"/>
-              <a:t>11/17/2022</a:t>
+              <a:t>11/25/2022</a:t>
             </a:fld>
             <a:endParaRPr lang="en-US"/>
           </a:p>
@@ -19644,7 +20861,7 @@
           <a:p>
             <a:fld id="{0A627400-D089-7447-864B-77479EBD4214}" type="datetimeFigureOut">
               <a:rPr lang="en-US" smtClean="0"/>
-              <a:t>11/17/2022</a:t>
+              <a:t>11/25/2022</a:t>
             </a:fld>
             <a:endParaRPr lang="en-US"/>
           </a:p>
@@ -19919,7 +21136,7 @@
           <a:p>
             <a:fld id="{0A627400-D089-7447-864B-77479EBD4214}" type="datetimeFigureOut">
               <a:rPr lang="en-US" smtClean="0"/>
-              <a:t>11/17/2022</a:t>
+              <a:t>11/25/2022</a:t>
             </a:fld>
             <a:endParaRPr lang="en-US"/>
           </a:p>
@@ -20184,7 +21401,7 @@
           <a:p>
             <a:fld id="{0A627400-D089-7447-864B-77479EBD4214}" type="datetimeFigureOut">
               <a:rPr lang="en-US" smtClean="0"/>
-              <a:t>11/17/2022</a:t>
+              <a:t>11/25/2022</a:t>
             </a:fld>
             <a:endParaRPr lang="en-US"/>
           </a:p>
@@ -20876,7 +22093,7 @@
           <a:p>
             <a:fld id="{0A627400-D089-7447-864B-77479EBD4214}" type="datetimeFigureOut">
               <a:rPr lang="en-US" smtClean="0"/>
-              <a:t>11/17/2022</a:t>
+              <a:t>11/25/2022</a:t>
             </a:fld>
             <a:endParaRPr lang="en-US"/>
           </a:p>
@@ -21082,7 +22299,7 @@
           <a:p>
             <a:fld id="{0A627400-D089-7447-864B-77479EBD4214}" type="datetimeFigureOut">
               <a:rPr lang="en-US" smtClean="0"/>
-              <a:t>11/17/2022</a:t>
+              <a:t>11/25/2022</a:t>
             </a:fld>
             <a:endParaRPr lang="en-US"/>
           </a:p>
@@ -21196,7 +22413,7 @@
             <a:fld id="{0A627400-D089-7447-864B-77479EBD4214}" type="datetimeFigureOut">
               <a:rPr lang="en-US" smtClean="0"/>
               <a:pPr/>
-              <a:t>11/17/2022</a:t>
+              <a:t>11/25/2022</a:t>
             </a:fld>
             <a:endParaRPr lang="en-US"/>
           </a:p>
@@ -21361,7 +22578,7 @@
             <a:fld id="{0A627400-D089-7447-864B-77479EBD4214}" type="datetimeFigureOut">
               <a:rPr lang="en-US" smtClean="0"/>
               <a:pPr/>
-              <a:t>11/17/2022</a:t>
+              <a:t>11/25/2022</a:t>
             </a:fld>
             <a:endParaRPr lang="en-US"/>
           </a:p>
@@ -21525,7 +22742,7 @@
           <a:p>
             <a:fld id="{0A627400-D089-7447-864B-77479EBD4214}" type="datetimeFigureOut">
               <a:rPr lang="en-US" smtClean="0"/>
-              <a:t>11/17/2022</a:t>
+              <a:t>11/25/2022</a:t>
             </a:fld>
             <a:endParaRPr lang="en-US"/>
           </a:p>
@@ -21638,7 +22855,7 @@
           <a:p>
             <a:fld id="{0A627400-D089-7447-864B-77479EBD4214}" type="datetimeFigureOut">
               <a:rPr lang="en-US" smtClean="0"/>
-              <a:t>11/17/2022</a:t>
+              <a:t>11/25/2022</a:t>
             </a:fld>
             <a:endParaRPr lang="en-US"/>
           </a:p>
@@ -21949,7 +23166,7 @@
           <a:p>
             <a:fld id="{0A627400-D089-7447-864B-77479EBD4214}" type="datetimeFigureOut">
               <a:rPr lang="en-US" smtClean="0"/>
-              <a:t>11/17/2022</a:t>
+              <a:t>11/25/2022</a:t>
             </a:fld>
             <a:endParaRPr lang="en-US"/>
           </a:p>
@@ -22237,7 +23454,7 @@
           <a:p>
             <a:fld id="{0A627400-D089-7447-864B-77479EBD4214}" type="datetimeFigureOut">
               <a:rPr lang="en-US" smtClean="0"/>
-              <a:t>11/17/2022</a:t>
+              <a:t>11/25/2022</a:t>
             </a:fld>
             <a:endParaRPr lang="en-US"/>
           </a:p>
@@ -31636,7 +32853,7 @@
             <a:fld id="{0A627400-D089-7447-864B-77479EBD4214}" type="datetimeFigureOut">
               <a:rPr lang="en-US" smtClean="0"/>
               <a:pPr/>
-              <a:t>11/17/2022</a:t>
+              <a:t>11/25/2022</a:t>
             </a:fld>
             <a:endParaRPr lang="en-US"/>
           </a:p>
@@ -32215,7 +33432,7 @@
             <a:fld id="{0A627400-D089-7447-864B-77479EBD4214}" type="datetimeFigureOut">
               <a:rPr lang="en-US" smtClean="0"/>
               <a:pPr/>
-              <a:t>11/17/2022</a:t>
+              <a:t>11/25/2022</a:t>
             </a:fld>
             <a:endParaRPr lang="en-US"/>
           </a:p>
@@ -32776,7 +33993,7 @@
           <a:p>
             <a:r>
               <a:rPr lang="en-US" dirty="0"/>
-              <a:t>Speaker Name</a:t>
+              <a:t>Isaac Levin</a:t>
             </a:r>
           </a:p>
         </p:txBody>
@@ -34003,8 +35220,8 @@
           <a:lstStyle/>
           <a:p>
             <a:r>
-              <a:rPr lang="en-US"/>
-              <a:t>ADD SLIDE FOR new .NET 7 STUFF</a:t>
+              <a:rPr lang="en-US" dirty="0"/>
+              <a:t>.NET in Ubuntu</a:t>
             </a:r>
           </a:p>
         </p:txBody>
@@ -34027,13 +35244,110 @@
         </p:nvSpPr>
         <p:spPr/>
         <p:txBody>
-          <a:bodyPr/>
+          <a:bodyPr>
+            <a:normAutofit lnSpcReduction="10000"/>
+          </a:bodyPr>
           <a:lstStyle/>
           <a:p>
-            <a:endParaRPr lang="en-US"/>
+            <a:pPr marL="0" indent="0">
+              <a:buNone/>
+            </a:pPr>
+            <a:r>
+              <a:rPr lang="en-US" dirty="0"/>
+              <a:t>.</a:t>
+            </a:r>
+            <a:r>
+              <a:rPr lang="en-US" sz="3200" dirty="0"/>
+              <a:t>NET is in-box</a:t>
+            </a:r>
+          </a:p>
+          <a:p>
+            <a:pPr lvl="1"/>
+            <a:endParaRPr lang="en-US" dirty="0"/>
+          </a:p>
+          <a:p>
+            <a:pPr lvl="1"/>
+            <a:r>
+              <a:rPr lang="en-US" dirty="0"/>
+              <a:t>Built by Canonical; help from Microsoft</a:t>
+            </a:r>
+          </a:p>
+          <a:p>
+            <a:pPr lvl="1"/>
+            <a:endParaRPr lang="en-US" dirty="0"/>
+          </a:p>
+          <a:p>
+            <a:pPr lvl="1"/>
+            <a:r>
+              <a:rPr lang="en-US" dirty="0"/>
+              <a:t>Canonical enterprise-grade support</a:t>
+            </a:r>
+          </a:p>
+          <a:p>
+            <a:pPr lvl="1"/>
+            <a:endParaRPr lang="en-US" dirty="0"/>
+          </a:p>
+          <a:p>
+            <a:pPr lvl="1"/>
+            <a:r>
+              <a:rPr lang="en-US" dirty="0"/>
+              <a:t>Same day updates for patches</a:t>
+            </a:r>
+          </a:p>
+          <a:p>
+            <a:pPr lvl="1"/>
+            <a:endParaRPr lang="en-US" dirty="0"/>
+          </a:p>
+          <a:p>
+            <a:pPr lvl="1"/>
+            <a:r>
+              <a:rPr lang="en-US" dirty="0"/>
+              <a:t>x64 and Arm64 with .NET 6</a:t>
+            </a:r>
+          </a:p>
+          <a:p>
+            <a:pPr lvl="1"/>
+            <a:endParaRPr lang="en-US" dirty="0"/>
+          </a:p>
+          <a:p>
+            <a:pPr lvl="1"/>
+            <a:r>
+              <a:rPr lang="en-US" dirty="0"/>
+              <a:t>.NET 7 coming soon</a:t>
+            </a:r>
           </a:p>
         </p:txBody>
       </p:sp>
+      <p:pic>
+        <p:nvPicPr>
+          <p:cNvPr id="10" name="Picture 9">
+            <a:extLst>
+              <a:ext uri="{FF2B5EF4-FFF2-40B4-BE49-F238E27FC236}">
+                <a16:creationId xmlns:a16="http://schemas.microsoft.com/office/drawing/2014/main" id="{B89E0BF3-F807-43F4-C0B9-F5EF75C369C4}"/>
+              </a:ext>
+            </a:extLst>
+          </p:cNvPr>
+          <p:cNvPicPr>
+            <a:picLocks noChangeAspect="1"/>
+          </p:cNvPicPr>
+          <p:nvPr/>
+        </p:nvPicPr>
+        <p:blipFill>
+          <a:blip r:embed="rId2"/>
+          <a:stretch>
+            <a:fillRect/>
+          </a:stretch>
+        </p:blipFill>
+        <p:spPr>
+          <a:xfrm>
+            <a:off x="7315505" y="2399994"/>
+            <a:ext cx="4602491" cy="2981315"/>
+          </a:xfrm>
+          <a:prstGeom prst="rect">
+            <a:avLst/>
+          </a:prstGeom>
+        </p:spPr>
+      </p:pic>
     </p:spTree>
     <p:extLst>
       <p:ext uri="{BB962C8B-B14F-4D97-AF65-F5344CB8AC3E}">
@@ -34048,6 +35362,552 @@
 </file>
 
 <file path=ppt/slides/slide14.xml><?xml version="1.0" encoding="utf-8"?>
+<p:sld xmlns:a="http://schemas.openxmlformats.org/drawingml/2006/main" xmlns:r="http://schemas.openxmlformats.org/officeDocument/2006/relationships" xmlns:p="http://schemas.openxmlformats.org/presentationml/2006/main">
+  <p:cSld>
+    <p:spTree>
+      <p:nvGrpSpPr>
+        <p:cNvPr id="1" name=""/>
+        <p:cNvGrpSpPr/>
+        <p:nvPr/>
+      </p:nvGrpSpPr>
+      <p:grpSpPr>
+        <a:xfrm>
+          <a:off x="0" y="0"/>
+          <a:ext cx="0" cy="0"/>
+          <a:chOff x="0" y="0"/>
+          <a:chExt cx="0" cy="0"/>
+        </a:xfrm>
+      </p:grpSpPr>
+      <p:sp>
+        <p:nvSpPr>
+          <p:cNvPr id="2" name="Title 1">
+            <a:extLst>
+              <a:ext uri="{FF2B5EF4-FFF2-40B4-BE49-F238E27FC236}">
+                <a16:creationId xmlns:a16="http://schemas.microsoft.com/office/drawing/2014/main" id="{93C4671A-A224-160F-F3D0-21DA1A86C566}"/>
+              </a:ext>
+            </a:extLst>
+          </p:cNvPr>
+          <p:cNvSpPr>
+            <a:spLocks noGrp="1"/>
+          </p:cNvSpPr>
+          <p:nvPr>
+            <p:ph type="title"/>
+          </p:nvPr>
+        </p:nvSpPr>
+        <p:spPr/>
+        <p:txBody>
+          <a:bodyPr/>
+          <a:lstStyle/>
+          <a:p>
+            <a:r>
+              <a:rPr lang="en-US" dirty="0"/>
+              <a:t>.NET in Ubuntu</a:t>
+            </a:r>
+          </a:p>
+        </p:txBody>
+      </p:sp>
+      <p:sp>
+        <p:nvSpPr>
+          <p:cNvPr id="3" name="Content Placeholder 2">
+            <a:extLst>
+              <a:ext uri="{FF2B5EF4-FFF2-40B4-BE49-F238E27FC236}">
+                <a16:creationId xmlns:a16="http://schemas.microsoft.com/office/drawing/2014/main" id="{5CE68882-C028-FFBD-A4AF-D26C908DDE9A}"/>
+              </a:ext>
+            </a:extLst>
+          </p:cNvPr>
+          <p:cNvSpPr>
+            <a:spLocks noGrp="1"/>
+          </p:cNvSpPr>
+          <p:nvPr>
+            <p:ph idx="1"/>
+          </p:nvPr>
+        </p:nvSpPr>
+        <p:spPr>
+          <a:xfrm>
+            <a:off x="855008" y="1851360"/>
+            <a:ext cx="10726460" cy="4437962"/>
+          </a:xfrm>
+        </p:spPr>
+        <p:txBody>
+          <a:bodyPr>
+            <a:normAutofit fontScale="77500" lnSpcReduction="20000"/>
+          </a:bodyPr>
+          <a:lstStyle/>
+          <a:p>
+            <a:endParaRPr lang="en-US" dirty="0"/>
+          </a:p>
+          <a:p>
+            <a:r>
+              <a:rPr lang="en-US" dirty="0"/>
+              <a:t>.NET in Chiseled Ubuntu containers</a:t>
+            </a:r>
+          </a:p>
+          <a:p>
+            <a:endParaRPr lang="en-US" dirty="0"/>
+          </a:p>
+          <a:p>
+            <a:r>
+              <a:rPr lang="en-US" dirty="0" err="1"/>
+              <a:t>Distroless</a:t>
+            </a:r>
+            <a:r>
+              <a:rPr lang="en-US" dirty="0"/>
+              <a:t> images == Bare minimum</a:t>
+            </a:r>
+          </a:p>
+          <a:p>
+            <a:endParaRPr lang="en-US" dirty="0"/>
+          </a:p>
+          <a:p>
+            <a:r>
+              <a:rPr lang="en-US" dirty="0"/>
+              <a:t>Quicker to pull/start</a:t>
+            </a:r>
+          </a:p>
+          <a:p>
+            <a:endParaRPr lang="en-US" dirty="0"/>
+          </a:p>
+          <a:p>
+            <a:r>
+              <a:rPr lang="en-US" dirty="0"/>
+              <a:t>More secure – no shell</a:t>
+            </a:r>
+          </a:p>
+          <a:p>
+            <a:endParaRPr lang="en-US" dirty="0"/>
+          </a:p>
+          <a:p>
+            <a:r>
+              <a:rPr lang="en-US" dirty="0"/>
+              <a:t>More secure – no package manager</a:t>
+            </a:r>
+          </a:p>
+          <a:p>
+            <a:endParaRPr lang="en-US" dirty="0"/>
+          </a:p>
+          <a:p>
+            <a:r>
+              <a:rPr lang="en-US" dirty="0"/>
+              <a:t>More secure – non-root user</a:t>
+            </a:r>
+          </a:p>
+        </p:txBody>
+      </p:sp>
+      <p:graphicFrame>
+        <p:nvGraphicFramePr>
+          <p:cNvPr id="6" name="Chart 5">
+            <a:extLst>
+              <a:ext uri="{FF2B5EF4-FFF2-40B4-BE49-F238E27FC236}">
+                <a16:creationId xmlns:a16="http://schemas.microsoft.com/office/drawing/2014/main" id="{8227D9C5-7F80-782A-1C60-84CE9C61725D}"/>
+              </a:ext>
+            </a:extLst>
+          </p:cNvPr>
+          <p:cNvGraphicFramePr/>
+          <p:nvPr>
+            <p:extLst>
+              <p:ext uri="{D42A27DB-BD31-4B8C-83A1-F6EECF244321}">
+                <p14:modId xmlns:p14="http://schemas.microsoft.com/office/powerpoint/2010/main" val="2230087365"/>
+              </p:ext>
+            </p:extLst>
+          </p:nvPr>
+        </p:nvGraphicFramePr>
+        <p:xfrm>
+          <a:off x="6126798" y="1851360"/>
+          <a:ext cx="6126413" cy="3860929"/>
+        </p:xfrm>
+        <a:graphic>
+          <a:graphicData uri="http://schemas.openxmlformats.org/drawingml/2006/chart">
+            <c:chart xmlns:c="http://schemas.openxmlformats.org/drawingml/2006/chart" xmlns:r="http://schemas.openxmlformats.org/officeDocument/2006/relationships" r:id="rId3"/>
+          </a:graphicData>
+        </a:graphic>
+      </p:graphicFrame>
+      <p:sp>
+        <p:nvSpPr>
+          <p:cNvPr id="7" name="TextBox 6">
+            <a:extLst>
+              <a:ext uri="{FF2B5EF4-FFF2-40B4-BE49-F238E27FC236}">
+                <a16:creationId xmlns:a16="http://schemas.microsoft.com/office/drawing/2014/main" id="{848BAAC6-E140-C126-ED9C-3B2B1A1A58C1}"/>
+              </a:ext>
+            </a:extLst>
+          </p:cNvPr>
+          <p:cNvSpPr txBox="1"/>
+          <p:nvPr/>
+        </p:nvSpPr>
+        <p:spPr>
+          <a:xfrm>
+            <a:off x="7955578" y="2396418"/>
+            <a:ext cx="910827" cy="369332"/>
+          </a:xfrm>
+          <a:prstGeom prst="rect">
+            <a:avLst/>
+          </a:prstGeom>
+          <a:noFill/>
+        </p:spPr>
+        <p:txBody>
+          <a:bodyPr wrap="none" rtlCol="0">
+            <a:spAutoFit/>
+          </a:bodyPr>
+          <a:lstStyle/>
+          <a:p>
+            <a:r>
+              <a:rPr lang="en-US" dirty="0"/>
+              <a:t>213 MB</a:t>
+            </a:r>
+          </a:p>
+        </p:txBody>
+      </p:sp>
+      <p:sp>
+        <p:nvSpPr>
+          <p:cNvPr id="8" name="TextBox 7">
+            <a:extLst>
+              <a:ext uri="{FF2B5EF4-FFF2-40B4-BE49-F238E27FC236}">
+                <a16:creationId xmlns:a16="http://schemas.microsoft.com/office/drawing/2014/main" id="{27C45F29-4DDB-1625-A518-EEF7B25A33C7}"/>
+              </a:ext>
+            </a:extLst>
+          </p:cNvPr>
+          <p:cNvSpPr txBox="1"/>
+          <p:nvPr/>
+        </p:nvSpPr>
+        <p:spPr>
+          <a:xfrm>
+            <a:off x="8866405" y="3585125"/>
+            <a:ext cx="910827" cy="369332"/>
+          </a:xfrm>
+          <a:prstGeom prst="rect">
+            <a:avLst/>
+          </a:prstGeom>
+          <a:noFill/>
+        </p:spPr>
+        <p:txBody>
+          <a:bodyPr wrap="none" rtlCol="0">
+            <a:spAutoFit/>
+          </a:bodyPr>
+          <a:lstStyle/>
+          <a:p>
+            <a:r>
+              <a:rPr lang="en-US" dirty="0"/>
+              <a:t>104 MB</a:t>
+            </a:r>
+          </a:p>
+        </p:txBody>
+      </p:sp>
+      <p:cxnSp>
+        <p:nvCxnSpPr>
+          <p:cNvPr id="10" name="Straight Connector 9">
+            <a:extLst>
+              <a:ext uri="{FF2B5EF4-FFF2-40B4-BE49-F238E27FC236}">
+                <a16:creationId xmlns:a16="http://schemas.microsoft.com/office/drawing/2014/main" id="{0EC51701-A66B-8F2A-C6CE-A00DD259AABB}"/>
+              </a:ext>
+            </a:extLst>
+          </p:cNvPr>
+          <p:cNvCxnSpPr/>
+          <p:nvPr/>
+        </p:nvCxnSpPr>
+        <p:spPr>
+          <a:xfrm>
+            <a:off x="7315505" y="5234603"/>
+            <a:ext cx="3657560" cy="0"/>
+          </a:xfrm>
+          <a:prstGeom prst="line">
+            <a:avLst/>
+          </a:prstGeom>
+        </p:spPr>
+        <p:style>
+          <a:lnRef idx="2">
+            <a:schemeClr val="accent2"/>
+          </a:lnRef>
+          <a:fillRef idx="0">
+            <a:schemeClr val="accent2"/>
+          </a:fillRef>
+          <a:effectRef idx="1">
+            <a:schemeClr val="accent2"/>
+          </a:effectRef>
+          <a:fontRef idx="minor">
+            <a:schemeClr val="tx1"/>
+          </a:fontRef>
+        </p:style>
+      </p:cxnSp>
+      <p:sp>
+        <p:nvSpPr>
+          <p:cNvPr id="11" name="Rectangle: Rounded Corners 10">
+            <a:extLst>
+              <a:ext uri="{FF2B5EF4-FFF2-40B4-BE49-F238E27FC236}">
+                <a16:creationId xmlns:a16="http://schemas.microsoft.com/office/drawing/2014/main" id="{460BF2FD-49F2-4541-D835-F96A9BC5A6CE}"/>
+              </a:ext>
+            </a:extLst>
+          </p:cNvPr>
+          <p:cNvSpPr/>
+          <p:nvPr/>
+        </p:nvSpPr>
+        <p:spPr>
+          <a:xfrm>
+            <a:off x="8961407" y="2891923"/>
+            <a:ext cx="1194052" cy="548630"/>
+          </a:xfrm>
+          <a:prstGeom prst="roundRect">
+            <a:avLst/>
+          </a:prstGeom>
+        </p:spPr>
+        <p:style>
+          <a:lnRef idx="2">
+            <a:schemeClr val="accent1">
+              <a:shade val="50000"/>
+            </a:schemeClr>
+          </a:lnRef>
+          <a:fillRef idx="1">
+            <a:schemeClr val="accent1"/>
+          </a:fillRef>
+          <a:effectRef idx="0">
+            <a:schemeClr val="accent1"/>
+          </a:effectRef>
+          <a:fontRef idx="minor">
+            <a:schemeClr val="lt1"/>
+          </a:fontRef>
+        </p:style>
+        <p:txBody>
+          <a:bodyPr rtlCol="0" anchor="ctr"/>
+          <a:lstStyle/>
+          <a:p>
+            <a:pPr algn="ctr"/>
+            <a:r>
+              <a:rPr lang="en-US" b="1" dirty="0"/>
+              <a:t>-52%</a:t>
+            </a:r>
+          </a:p>
+        </p:txBody>
+      </p:sp>
+    </p:spTree>
+    <p:extLst>
+      <p:ext uri="{BB962C8B-B14F-4D97-AF65-F5344CB8AC3E}">
+        <p14:creationId xmlns:p14="http://schemas.microsoft.com/office/powerpoint/2010/main" val="554842494"/>
+      </p:ext>
+    </p:extLst>
+  </p:cSld>
+  <p:clrMapOvr>
+    <a:masterClrMapping/>
+  </p:clrMapOvr>
+</p:sld>
+</file>
+
+<file path=ppt/slides/slide15.xml><?xml version="1.0" encoding="utf-8"?>
+<p:sld xmlns:a="http://schemas.openxmlformats.org/drawingml/2006/main" xmlns:r="http://schemas.openxmlformats.org/officeDocument/2006/relationships" xmlns:p="http://schemas.openxmlformats.org/presentationml/2006/main">
+  <p:cSld>
+    <p:spTree>
+      <p:nvGrpSpPr>
+        <p:cNvPr id="1" name=""/>
+        <p:cNvGrpSpPr/>
+        <p:nvPr/>
+      </p:nvGrpSpPr>
+      <p:grpSpPr>
+        <a:xfrm>
+          <a:off x="0" y="0"/>
+          <a:ext cx="0" cy="0"/>
+          <a:chOff x="0" y="0"/>
+          <a:chExt cx="0" cy="0"/>
+        </a:xfrm>
+      </p:grpSpPr>
+      <p:sp>
+        <p:nvSpPr>
+          <p:cNvPr id="2" name="Title 1">
+            <a:extLst>
+              <a:ext uri="{FF2B5EF4-FFF2-40B4-BE49-F238E27FC236}">
+                <a16:creationId xmlns:a16="http://schemas.microsoft.com/office/drawing/2014/main" id="{CC8F0A3A-A320-3163-3CF9-653C0B4E121A}"/>
+              </a:ext>
+            </a:extLst>
+          </p:cNvPr>
+          <p:cNvSpPr>
+            <a:spLocks noGrp="1"/>
+          </p:cNvSpPr>
+          <p:nvPr>
+            <p:ph type="title"/>
+          </p:nvPr>
+        </p:nvSpPr>
+        <p:spPr/>
+        <p:txBody>
+          <a:bodyPr/>
+          <a:lstStyle/>
+          <a:p>
+            <a:r>
+              <a:rPr lang="en-US" dirty="0"/>
+              <a:t>Built-in Container Support in .NET</a:t>
+            </a:r>
+          </a:p>
+        </p:txBody>
+      </p:sp>
+      <p:pic>
+        <p:nvPicPr>
+          <p:cNvPr id="1028" name="Picture 4" descr="containerd hero logo">
+            <a:extLst>
+              <a:ext uri="{FF2B5EF4-FFF2-40B4-BE49-F238E27FC236}">
+                <a16:creationId xmlns:a16="http://schemas.microsoft.com/office/drawing/2014/main" id="{0237AB54-3655-30FB-206D-D5BFC0DEA164}"/>
+              </a:ext>
+            </a:extLst>
+          </p:cNvPr>
+          <p:cNvPicPr>
+            <a:picLocks noChangeAspect="1" noChangeArrowheads="1"/>
+          </p:cNvPicPr>
+          <p:nvPr/>
+        </p:nvPicPr>
+        <p:blipFill>
+          <a:blip r:embed="rId3">
+            <a:extLst>
+              <a:ext uri="{28A0092B-C50C-407E-A947-70E740481C1C}">
+                <a14:useLocalDpi xmlns:a14="http://schemas.microsoft.com/office/drawing/2010/main" val="0"/>
+              </a:ext>
+            </a:extLst>
+          </a:blip>
+          <a:srcRect/>
+          <a:stretch>
+            <a:fillRect/>
+          </a:stretch>
+        </p:blipFill>
+        <p:spPr bwMode="auto">
+          <a:xfrm>
+            <a:off x="8641557" y="5508920"/>
+            <a:ext cx="2743200" cy="707231"/>
+          </a:xfrm>
+          <a:prstGeom prst="rect">
+            <a:avLst/>
+          </a:prstGeom>
+          <a:noFill/>
+          <a:extLst>
+            <a:ext uri="{909E8E84-426E-40DD-AFC4-6F175D3DCCD1}">
+              <a14:hiddenFill xmlns:a14="http://schemas.microsoft.com/office/drawing/2010/main">
+                <a:solidFill>
+                  <a:srgbClr val="FFFFFF"/>
+                </a:solidFill>
+              </a14:hiddenFill>
+            </a:ext>
+          </a:extLst>
+        </p:spPr>
+      </p:pic>
+      <p:pic>
+        <p:nvPicPr>
+          <p:cNvPr id="7" name="Graphic 6">
+            <a:extLst>
+              <a:ext uri="{FF2B5EF4-FFF2-40B4-BE49-F238E27FC236}">
+                <a16:creationId xmlns:a16="http://schemas.microsoft.com/office/drawing/2014/main" id="{8886543D-9595-323E-34A9-130D5B91B2A0}"/>
+              </a:ext>
+            </a:extLst>
+          </p:cNvPr>
+          <p:cNvPicPr>
+            <a:picLocks noChangeAspect="1"/>
+          </p:cNvPicPr>
+          <p:nvPr/>
+        </p:nvPicPr>
+        <p:blipFill>
+          <a:blip r:embed="rId4">
+            <a:extLst>
+              <a:ext uri="{96DAC541-7B7A-43D3-8B79-37D633B846F1}">
+                <asvg:svgBlip xmlns:asvg="http://schemas.microsoft.com/office/drawing/2016/SVG/main" r:embed="rId5"/>
+              </a:ext>
+            </a:extLst>
+          </a:blip>
+          <a:stretch>
+            <a:fillRect/>
+          </a:stretch>
+        </p:blipFill>
+        <p:spPr>
+          <a:xfrm>
+            <a:off x="1051719" y="5600359"/>
+            <a:ext cx="2743200" cy="734275"/>
+          </a:xfrm>
+          <a:prstGeom prst="rect">
+            <a:avLst/>
+          </a:prstGeom>
+        </p:spPr>
+      </p:pic>
+      <p:pic>
+        <p:nvPicPr>
+          <p:cNvPr id="1038" name="Picture 14" descr="See the source image">
+            <a:extLst>
+              <a:ext uri="{FF2B5EF4-FFF2-40B4-BE49-F238E27FC236}">
+                <a16:creationId xmlns:a16="http://schemas.microsoft.com/office/drawing/2014/main" id="{C4C68C13-BA1E-3594-8BD7-7916EA357F71}"/>
+              </a:ext>
+            </a:extLst>
+          </p:cNvPr>
+          <p:cNvPicPr>
+            <a:picLocks noChangeAspect="1" noChangeArrowheads="1"/>
+          </p:cNvPicPr>
+          <p:nvPr/>
+        </p:nvPicPr>
+        <p:blipFill>
+          <a:blip r:embed="rId6">
+            <a:extLst>
+              <a:ext uri="{28A0092B-C50C-407E-A947-70E740481C1C}">
+                <a14:useLocalDpi xmlns:a14="http://schemas.microsoft.com/office/drawing/2010/main" val="0"/>
+              </a:ext>
+            </a:extLst>
+          </a:blip>
+          <a:srcRect/>
+          <a:stretch>
+            <a:fillRect/>
+          </a:stretch>
+        </p:blipFill>
+        <p:spPr bwMode="auto">
+          <a:xfrm>
+            <a:off x="4846638" y="5091021"/>
+            <a:ext cx="2743200" cy="1543028"/>
+          </a:xfrm>
+          <a:prstGeom prst="rect">
+            <a:avLst/>
+          </a:prstGeom>
+          <a:noFill/>
+          <a:extLst>
+            <a:ext uri="{909E8E84-426E-40DD-AFC4-6F175D3DCCD1}">
+              <a14:hiddenFill xmlns:a14="http://schemas.microsoft.com/office/drawing/2010/main">
+                <a:solidFill>
+                  <a:srgbClr val="FFFFFF"/>
+                </a:solidFill>
+              </a14:hiddenFill>
+            </a:ext>
+          </a:extLst>
+        </p:spPr>
+      </p:pic>
+      <p:pic>
+        <p:nvPicPr>
+          <p:cNvPr id="9" name="Picture 8">
+            <a:extLst>
+              <a:ext uri="{FF2B5EF4-FFF2-40B4-BE49-F238E27FC236}">
+                <a16:creationId xmlns:a16="http://schemas.microsoft.com/office/drawing/2014/main" id="{5A5D5288-C6E3-65C6-40E2-07E998AF7679}"/>
+              </a:ext>
+            </a:extLst>
+          </p:cNvPr>
+          <p:cNvPicPr>
+            <a:picLocks noChangeAspect="1"/>
+          </p:cNvPicPr>
+          <p:nvPr/>
+        </p:nvPicPr>
+        <p:blipFill>
+          <a:blip r:embed="rId7"/>
+          <a:stretch>
+            <a:fillRect/>
+          </a:stretch>
+        </p:blipFill>
+        <p:spPr>
+          <a:xfrm>
+            <a:off x="55562" y="1697037"/>
+            <a:ext cx="12325350" cy="3600450"/>
+          </a:xfrm>
+          <a:prstGeom prst="rect">
+            <a:avLst/>
+          </a:prstGeom>
+        </p:spPr>
+      </p:pic>
+    </p:spTree>
+    <p:extLst>
+      <p:ext uri="{BB962C8B-B14F-4D97-AF65-F5344CB8AC3E}">
+        <p14:creationId xmlns:p14="http://schemas.microsoft.com/office/powerpoint/2010/main" val="3552270137"/>
+      </p:ext>
+    </p:extLst>
+  </p:cSld>
+  <p:clrMapOvr>
+    <a:masterClrMapping/>
+  </p:clrMapOvr>
+</p:sld>
+</file>
+
+<file path=ppt/slides/slide16.xml><?xml version="1.0" encoding="utf-8"?>
 <p:sld xmlns:a="http://schemas.openxmlformats.org/drawingml/2006/main" xmlns:r="http://schemas.openxmlformats.org/officeDocument/2006/relationships" xmlns:p="http://schemas.openxmlformats.org/presentationml/2006/main">
   <p:cSld>
     <p:spTree>
@@ -34255,7 +36115,7 @@
 </p:sld>
 </file>
 
-<file path=ppt/slides/slide15.xml><?xml version="1.0" encoding="utf-8"?>
+<file path=ppt/slides/slide17.xml><?xml version="1.0" encoding="utf-8"?>
 <p:sld xmlns:a="http://schemas.openxmlformats.org/drawingml/2006/main" xmlns:r="http://schemas.openxmlformats.org/officeDocument/2006/relationships" xmlns:p="http://schemas.openxmlformats.org/presentationml/2006/main">
   <p:cSld>
     <p:spTree>
@@ -34461,271 +36321,6 @@
     <p:extLst>
       <p:ext uri="{BB962C8B-B14F-4D97-AF65-F5344CB8AC3E}">
         <p14:creationId xmlns:p14="http://schemas.microsoft.com/office/powerpoint/2010/main" val="3795515224"/>
-      </p:ext>
-    </p:extLst>
-  </p:cSld>
-  <p:clrMapOvr>
-    <a:masterClrMapping/>
-  </p:clrMapOvr>
-</p:sld>
-</file>
-
-<file path=ppt/slides/slide16.xml><?xml version="1.0" encoding="utf-8"?>
-<p:sld xmlns:a="http://schemas.openxmlformats.org/drawingml/2006/main" xmlns:r="http://schemas.openxmlformats.org/officeDocument/2006/relationships" xmlns:p="http://schemas.openxmlformats.org/presentationml/2006/main">
-  <p:cSld>
-    <p:spTree>
-      <p:nvGrpSpPr>
-        <p:cNvPr id="1" name=""/>
-        <p:cNvGrpSpPr/>
-        <p:nvPr/>
-      </p:nvGrpSpPr>
-      <p:grpSpPr>
-        <a:xfrm>
-          <a:off x="0" y="0"/>
-          <a:ext cx="0" cy="0"/>
-          <a:chOff x="0" y="0"/>
-          <a:chExt cx="0" cy="0"/>
-        </a:xfrm>
-      </p:grpSpPr>
-      <p:sp>
-        <p:nvSpPr>
-          <p:cNvPr id="5" name="Title 1">
-            <a:extLst>
-              <a:ext uri="{FF2B5EF4-FFF2-40B4-BE49-F238E27FC236}">
-                <a16:creationId xmlns:a16="http://schemas.microsoft.com/office/drawing/2014/main" id="{239E6567-A62B-49A7-9295-D7C012ABFC08}"/>
-              </a:ext>
-            </a:extLst>
-          </p:cNvPr>
-          <p:cNvSpPr>
-            <a:spLocks noGrp="1"/>
-          </p:cNvSpPr>
-          <p:nvPr>
-            <p:ph type="title"/>
-          </p:nvPr>
-        </p:nvSpPr>
-        <p:spPr>
-          <a:xfrm>
-            <a:off x="274637" y="2125677"/>
-            <a:ext cx="11064183" cy="2179058"/>
-          </a:xfrm>
-        </p:spPr>
-        <p:txBody>
-          <a:bodyPr>
-            <a:normAutofit fontScale="90000"/>
-          </a:bodyPr>
-          <a:lstStyle/>
-          <a:p>
-            <a:r>
-              <a:rPr lang="en-US" dirty="0"/>
-              <a:t>Lab: </a:t>
-            </a:r>
-            <a:br>
-              <a:rPr lang="en-US" dirty="0"/>
-            </a:br>
-            <a:r>
-              <a:rPr lang="en-US" dirty="0"/>
-              <a:t>Development workflow for Docker apps</a:t>
-            </a:r>
-          </a:p>
-        </p:txBody>
-      </p:sp>
-      <p:sp>
-        <p:nvSpPr>
-          <p:cNvPr id="6" name="Text Placeholder 2">
-            <a:extLst>
-              <a:ext uri="{FF2B5EF4-FFF2-40B4-BE49-F238E27FC236}">
-                <a16:creationId xmlns:a16="http://schemas.microsoft.com/office/drawing/2014/main" id="{4FA84193-BBF6-4D54-9989-9442F744F21B}"/>
-              </a:ext>
-            </a:extLst>
-          </p:cNvPr>
-          <p:cNvSpPr txBox="1">
-            <a:spLocks/>
-          </p:cNvSpPr>
-          <p:nvPr/>
-        </p:nvSpPr>
-        <p:spPr>
-          <a:xfrm>
-            <a:off x="457580" y="4777408"/>
-            <a:ext cx="11338500" cy="1181862"/>
-          </a:xfrm>
-          <a:prstGeom prst="rect">
-            <a:avLst/>
-          </a:prstGeom>
-        </p:spPr>
-        <p:txBody>
-          <a:bodyPr vert="horz" lIns="91440" tIns="45720" rIns="91440" bIns="45720" rtlCol="0" anchor="ctr"/>
-          <a:lstStyle>
-            <a:defPPr>
-              <a:defRPr lang="en-US"/>
-            </a:defPPr>
-            <a:lvl1pPr marL="0" algn="r" defTabSz="932742" rtl="0" eaLnBrk="1" latinLnBrk="0" hangingPunct="1">
-              <a:defRPr sz="1224" kern="1200">
-                <a:solidFill>
-                  <a:schemeClr val="tx2"/>
-                </a:solidFill>
-                <a:latin typeface="Open Sans" panose="020B0606030504020204" pitchFamily="34" charset="0"/>
-                <a:ea typeface="Open Sans" panose="020B0606030504020204" pitchFamily="34" charset="0"/>
-                <a:cs typeface="Open Sans" panose="020B0606030504020204" pitchFamily="34" charset="0"/>
-              </a:defRPr>
-            </a:lvl1pPr>
-            <a:lvl2pPr marL="466371" algn="l" defTabSz="932742" rtl="0" eaLnBrk="1" latinLnBrk="0" hangingPunct="1">
-              <a:defRPr sz="1800" kern="1200">
-                <a:solidFill>
-                  <a:schemeClr val="tx1"/>
-                </a:solidFill>
-                <a:latin typeface="+mn-lt"/>
-                <a:ea typeface="+mn-ea"/>
-                <a:cs typeface="+mn-cs"/>
-              </a:defRPr>
-            </a:lvl2pPr>
-            <a:lvl3pPr marL="932742" algn="l" defTabSz="932742" rtl="0" eaLnBrk="1" latinLnBrk="0" hangingPunct="1">
-              <a:defRPr sz="1800" kern="1200">
-                <a:solidFill>
-                  <a:schemeClr val="tx1"/>
-                </a:solidFill>
-                <a:latin typeface="+mn-lt"/>
-                <a:ea typeface="+mn-ea"/>
-                <a:cs typeface="+mn-cs"/>
-              </a:defRPr>
-            </a:lvl3pPr>
-            <a:lvl4pPr marL="1399113" algn="l" defTabSz="932742" rtl="0" eaLnBrk="1" latinLnBrk="0" hangingPunct="1">
-              <a:defRPr sz="1800" kern="1200">
-                <a:solidFill>
-                  <a:schemeClr val="tx1"/>
-                </a:solidFill>
-                <a:latin typeface="+mn-lt"/>
-                <a:ea typeface="+mn-ea"/>
-                <a:cs typeface="+mn-cs"/>
-              </a:defRPr>
-            </a:lvl4pPr>
-            <a:lvl5pPr marL="1865484" algn="l" defTabSz="932742" rtl="0" eaLnBrk="1" latinLnBrk="0" hangingPunct="1">
-              <a:defRPr sz="1800" kern="1200">
-                <a:solidFill>
-                  <a:schemeClr val="tx1"/>
-                </a:solidFill>
-                <a:latin typeface="+mn-lt"/>
-                <a:ea typeface="+mn-ea"/>
-                <a:cs typeface="+mn-cs"/>
-              </a:defRPr>
-            </a:lvl5pPr>
-            <a:lvl6pPr marL="2331856" algn="l" defTabSz="932742" rtl="0" eaLnBrk="1" latinLnBrk="0" hangingPunct="1">
-              <a:defRPr sz="1800" kern="1200">
-                <a:solidFill>
-                  <a:schemeClr val="tx1"/>
-                </a:solidFill>
-                <a:latin typeface="+mn-lt"/>
-                <a:ea typeface="+mn-ea"/>
-                <a:cs typeface="+mn-cs"/>
-              </a:defRPr>
-            </a:lvl6pPr>
-            <a:lvl7pPr marL="2798226" algn="l" defTabSz="932742" rtl="0" eaLnBrk="1" latinLnBrk="0" hangingPunct="1">
-              <a:defRPr sz="1800" kern="1200">
-                <a:solidFill>
-                  <a:schemeClr val="tx1"/>
-                </a:solidFill>
-                <a:latin typeface="+mn-lt"/>
-                <a:ea typeface="+mn-ea"/>
-                <a:cs typeface="+mn-cs"/>
-              </a:defRPr>
-            </a:lvl7pPr>
-            <a:lvl8pPr marL="3264597" algn="l" defTabSz="932742" rtl="0" eaLnBrk="1" latinLnBrk="0" hangingPunct="1">
-              <a:defRPr sz="1800" kern="1200">
-                <a:solidFill>
-                  <a:schemeClr val="tx1"/>
-                </a:solidFill>
-                <a:latin typeface="+mn-lt"/>
-                <a:ea typeface="+mn-ea"/>
-                <a:cs typeface="+mn-cs"/>
-              </a:defRPr>
-            </a:lvl8pPr>
-            <a:lvl9pPr marL="3730969" algn="l" defTabSz="932742" rtl="0" eaLnBrk="1" latinLnBrk="0" hangingPunct="1">
-              <a:defRPr sz="1800" kern="1200">
-                <a:solidFill>
-                  <a:schemeClr val="tx1"/>
-                </a:solidFill>
-                <a:latin typeface="+mn-lt"/>
-                <a:ea typeface="+mn-ea"/>
-                <a:cs typeface="+mn-cs"/>
-              </a:defRPr>
-            </a:lvl9pPr>
-          </a:lstStyle>
-          <a:p>
-            <a:pPr algn="l"/>
-            <a:r>
-              <a:rPr lang="en-US" sz="2800" dirty="0">
-                <a:solidFill>
-                  <a:schemeClr val="tx1"/>
-                </a:solidFill>
-                <a:hlinkClick r:id="rId2">
-                  <a:extLst>
-                    <a:ext uri="{A12FA001-AC4F-418D-AE19-62706E023703}">
-                      <ahyp:hlinkClr xmlns:ahyp="http://schemas.microsoft.com/office/drawing/2018/hyperlinkcolor" val="tx"/>
-                    </a:ext>
-                  </a:extLst>
-                </a:hlinkClick>
-              </a:rPr>
-              <a:t>Windows setup</a:t>
-            </a:r>
-          </a:p>
-          <a:p>
-            <a:pPr algn="l"/>
-            <a:r>
-              <a:rPr lang="en-US" sz="2800" dirty="0">
-                <a:solidFill>
-                  <a:schemeClr val="tx1"/>
-                </a:solidFill>
-                <a:hlinkClick r:id="rId2">
-                  <a:extLst>
-                    <a:ext uri="{A12FA001-AC4F-418D-AE19-62706E023703}">
-                      <ahyp:hlinkClr xmlns:ahyp="http://schemas.microsoft.com/office/drawing/2018/hyperlinkcolor" val="tx"/>
-                    </a:ext>
-                  </a:extLst>
-                </a:hlinkClick>
-              </a:rPr>
-              <a:t>dotnet-architecture/</a:t>
-            </a:r>
-            <a:r>
-              <a:rPr lang="en-US" sz="2800" dirty="0" err="1">
-                <a:solidFill>
-                  <a:schemeClr val="tx1"/>
-                </a:solidFill>
-                <a:hlinkClick r:id="rId2">
-                  <a:extLst>
-                    <a:ext uri="{A12FA001-AC4F-418D-AE19-62706E023703}">
-                      <ahyp:hlinkClr xmlns:ahyp="http://schemas.microsoft.com/office/drawing/2018/hyperlinkcolor" val="tx"/>
-                    </a:ext>
-                  </a:extLst>
-                </a:hlinkClick>
-              </a:rPr>
-              <a:t>eShopOnContainers</a:t>
-            </a:r>
-            <a:r>
-              <a:rPr lang="en-US" sz="2800" dirty="0">
-                <a:solidFill>
-                  <a:schemeClr val="tx1"/>
-                </a:solidFill>
-                <a:hlinkClick r:id="rId2">
-                  <a:extLst>
-                    <a:ext uri="{A12FA001-AC4F-418D-AE19-62706E023703}">
-                      <ahyp:hlinkClr xmlns:ahyp="http://schemas.microsoft.com/office/drawing/2018/hyperlinkcolor" val="tx"/>
-                    </a:ext>
-                  </a:extLst>
-                </a:hlinkClick>
-              </a:rPr>
-              <a:t> Wiki</a:t>
-            </a:r>
-            <a:endParaRPr lang="en-US" sz="2800" dirty="0">
-              <a:solidFill>
-                <a:schemeClr val="tx1"/>
-              </a:solidFill>
-            </a:endParaRPr>
-          </a:p>
-        </p:txBody>
-      </p:sp>
-    </p:spTree>
-    <p:extLst>
-      <p:ext uri="{BB962C8B-B14F-4D97-AF65-F5344CB8AC3E}">
-        <p14:creationId xmlns:p14="http://schemas.microsoft.com/office/powerpoint/2010/main" val="400124637"/>
       </p:ext>
     </p:extLst>
   </p:cSld>

</xml_diff>